<commit_message>
update models and document
Added logic controller model with multistate and coil/contact types and objects
</commit_message>
<xml_diff>
--- a/documents/IotForIndustrialControls.pptx
+++ b/documents/IotForIndustrialControls.pptx
@@ -9228,10 +9228,10 @@
           <a:p>
             <a:pPr algn="ctr"/>
             <a:r>
-              <a:rPr lang="en-US" smtClean="0"/>
+              <a:rPr lang="en-US" dirty="0" smtClean="0"/>
               <a:t>SDF Models</a:t>
             </a:r>
-            <a:endParaRPr lang="en-US"/>
+            <a:endParaRPr lang="en-US" dirty="0"/>
           </a:p>
         </p:txBody>
       </p:sp>
@@ -9343,7 +9343,11 @@
             <a:pPr algn="ctr"/>
             <a:r>
               <a:rPr lang="en-US" sz="1600" dirty="0" smtClean="0"/>
-              <a:t>IEC 61499 Models</a:t>
+              <a:t>IEC 61499 </a:t>
+            </a:r>
+            <a:r>
+              <a:rPr lang="en-US" sz="1600" dirty="0" err="1" smtClean="0"/>
+              <a:t>FBTypes</a:t>
             </a:r>
             <a:endParaRPr lang="en-US" sz="1600" dirty="0"/>
           </a:p>
@@ -9413,7 +9417,18 @@
             <a:pPr algn="ctr"/>
             <a:r>
               <a:rPr lang="en-US" sz="1600" dirty="0" smtClean="0"/>
-              <a:t>OPC-UA Models</a:t>
+              <a:t>OPC-UA </a:t>
+            </a:r>
+            <a:r>
+              <a:rPr lang="en-US" sz="1600" dirty="0" smtClean="0"/>
+              <a:t>Info</a:t>
+            </a:r>
+          </a:p>
+          <a:p>
+            <a:pPr algn="ctr"/>
+            <a:r>
+              <a:rPr lang="en-US" sz="1600" dirty="0" smtClean="0"/>
+              <a:t>Models</a:t>
             </a:r>
             <a:endParaRPr lang="en-US" sz="1600" dirty="0"/>
           </a:p>

</xml_diff>

<commit_message>
Refactor and add control logic examples
Refactor and add control logic examples
</commit_message>
<xml_diff>
--- a/documents/IotForIndustrialControls.pptx
+++ b/documents/IotForIndustrialControls.pptx
@@ -14,14 +14,15 @@
     <p:sldId id="262" r:id="rId8"/>
     <p:sldId id="266" r:id="rId9"/>
     <p:sldId id="263" r:id="rId10"/>
-    <p:sldId id="264" r:id="rId11"/>
-    <p:sldId id="265" r:id="rId12"/>
-    <p:sldId id="267" r:id="rId13"/>
-    <p:sldId id="268" r:id="rId14"/>
-    <p:sldId id="269" r:id="rId15"/>
-    <p:sldId id="270" r:id="rId16"/>
-    <p:sldId id="271" r:id="rId17"/>
-    <p:sldId id="273" r:id="rId18"/>
+    <p:sldId id="275" r:id="rId11"/>
+    <p:sldId id="264" r:id="rId12"/>
+    <p:sldId id="265" r:id="rId13"/>
+    <p:sldId id="267" r:id="rId14"/>
+    <p:sldId id="268" r:id="rId15"/>
+    <p:sldId id="269" r:id="rId16"/>
+    <p:sldId id="270" r:id="rId17"/>
+    <p:sldId id="271" r:id="rId18"/>
+    <p:sldId id="273" r:id="rId19"/>
   </p:sldIdLst>
   <p:sldSz cx="9144000" cy="6858000" type="screen4x3"/>
   <p:notesSz cx="6858000" cy="9144000"/>
@@ -3038,14 +3039,19 @@
             <p:ph type="title"/>
           </p:nvPr>
         </p:nvSpPr>
-        <p:spPr/>
+        <p:spPr>
+          <a:xfrm>
+            <a:off x="628650" y="54014"/>
+            <a:ext cx="7886700" cy="1325563"/>
+          </a:xfrm>
+        </p:spPr>
         <p:txBody>
           <a:bodyPr/>
           <a:lstStyle/>
           <a:p>
             <a:r>
               <a:rPr lang="en-US" dirty="0" smtClean="0"/>
-              <a:t>System Tools and Components</a:t>
+              <a:t>Using SDF with OPC UA</a:t>
             </a:r>
             <a:endParaRPr lang="en-US" dirty="0"/>
           </a:p>
@@ -3061,52 +3067,678 @@
             <p:ph idx="1"/>
           </p:nvPr>
         </p:nvSpPr>
-        <p:spPr/>
+        <p:spPr>
+          <a:xfrm>
+            <a:off x="628650" y="1301617"/>
+            <a:ext cx="7886700" cy="1642404"/>
+          </a:xfrm>
+        </p:spPr>
         <p:txBody>
           <a:bodyPr/>
           <a:lstStyle/>
           <a:p>
             <a:r>
               <a:rPr lang="en-US" dirty="0" smtClean="0"/>
-              <a:t>System design </a:t>
+              <a:t>SDF can represent OPC UA information models</a:t>
+            </a:r>
+          </a:p>
+          <a:p>
+            <a:r>
+              <a:rPr lang="en-US" dirty="0" smtClean="0"/>
+              <a:t>OPC UA </a:t>
             </a:r>
             <a:r>
               <a:rPr lang="en-US" dirty="0"/>
-              <a:t>tools and </a:t>
-            </a:r>
-            <a:r>
-              <a:rPr lang="en-US" dirty="0" smtClean="0"/>
-              <a:t>configuration manifest</a:t>
-            </a:r>
-          </a:p>
-          <a:p>
-            <a:r>
-              <a:rPr lang="en-US" dirty="0" smtClean="0"/>
-              <a:t>Control loop and sub-system modeling</a:t>
-            </a:r>
-            <a:endParaRPr lang="en-US" dirty="0"/>
-          </a:p>
-          <a:p>
-            <a:r>
-              <a:rPr lang="en-US" dirty="0" smtClean="0"/>
-              <a:t>Centralized logging and alarms</a:t>
-            </a:r>
-          </a:p>
-          <a:p>
-            <a:r>
-              <a:rPr lang="en-US" dirty="0" smtClean="0"/>
-              <a:t>Digital Twin framework</a:t>
-            </a:r>
-          </a:p>
-          <a:p>
-            <a:endParaRPr lang="en-US" dirty="0" smtClean="0"/>
-          </a:p>
-        </p:txBody>
-      </p:sp>
+              <a:t>can implement SDF </a:t>
+            </a:r>
+            <a:r>
+              <a:rPr lang="en-US" dirty="0" smtClean="0"/>
+              <a:t>Models</a:t>
+            </a:r>
+          </a:p>
+        </p:txBody>
+      </p:sp>
+      <p:graphicFrame>
+        <p:nvGraphicFramePr>
+          <p:cNvPr id="4" name="Table 3"/>
+          <p:cNvGraphicFramePr>
+            <a:graphicFrameLocks noGrp="1"/>
+          </p:cNvGraphicFramePr>
+          <p:nvPr>
+            <p:extLst>
+              <p:ext uri="{D42A27DB-BD31-4B8C-83A1-F6EECF244321}">
+                <p14:modId xmlns:p14="http://schemas.microsoft.com/office/powerpoint/2010/main" val="657881261"/>
+              </p:ext>
+            </p:extLst>
+          </p:nvPr>
+        </p:nvGraphicFramePr>
+        <p:xfrm>
+          <a:off x="1051468" y="2537872"/>
+          <a:ext cx="6531362" cy="3657600"/>
+        </p:xfrm>
+        <a:graphic>
+          <a:graphicData uri="http://schemas.openxmlformats.org/drawingml/2006/table">
+            <a:tbl>
+              <a:tblPr firstRow="1" bandRow="1">
+                <a:tableStyleId>{5C22544A-7EE6-4342-B048-85BDC9FD1C3A}</a:tableStyleId>
+              </a:tblPr>
+              <a:tblGrid>
+                <a:gridCol w="2907216"/>
+                <a:gridCol w="3624146"/>
+              </a:tblGrid>
+              <a:tr h="0">
+                <a:tc>
+                  <a:txBody>
+                    <a:bodyPr/>
+                    <a:lstStyle/>
+                    <a:p>
+                      <a:r>
+                        <a:rPr lang="en-US" smtClean="0"/>
+                        <a:t>OPC</a:t>
+                      </a:r>
+                      <a:r>
+                        <a:rPr lang="en-US" baseline="0" smtClean="0"/>
+                        <a:t> </a:t>
+                      </a:r>
+                      <a:r>
+                        <a:rPr lang="en-US" smtClean="0"/>
+                        <a:t>UA </a:t>
+                      </a:r>
+                      <a:endParaRPr lang="en-US" dirty="0"/>
+                    </a:p>
+                  </a:txBody>
+                  <a:tcPr/>
+                </a:tc>
+                <a:tc>
+                  <a:txBody>
+                    <a:bodyPr/>
+                    <a:lstStyle/>
+                    <a:p>
+                      <a:r>
+                        <a:rPr lang="en-US" dirty="0" smtClean="0"/>
+                        <a:t>SDF</a:t>
+                      </a:r>
+                      <a:endParaRPr lang="en-US" dirty="0"/>
+                    </a:p>
+                  </a:txBody>
+                  <a:tcPr/>
+                </a:tc>
+              </a:tr>
+              <a:tr h="357569">
+                <a:tc>
+                  <a:txBody>
+                    <a:bodyPr/>
+                    <a:lstStyle/>
+                    <a:p>
+                      <a:pPr marL="0" marR="0" lvl="1" indent="0" algn="l" defTabSz="914400" rtl="0" eaLnBrk="1" fontAlgn="auto" latinLnBrk="0" hangingPunct="1">
+                        <a:lnSpc>
+                          <a:spcPct val="100000"/>
+                        </a:lnSpc>
+                        <a:spcBef>
+                          <a:spcPts val="0"/>
+                        </a:spcBef>
+                        <a:spcAft>
+                          <a:spcPts val="0"/>
+                        </a:spcAft>
+                        <a:buClrTx/>
+                        <a:buSzTx/>
+                        <a:buFontTx/>
+                        <a:buNone/>
+                        <a:tabLst/>
+                        <a:defRPr/>
+                      </a:pPr>
+                      <a:r>
+                        <a:rPr lang="en-US" dirty="0" smtClean="0"/>
+                        <a:t>Object (type) </a:t>
+                      </a:r>
+                    </a:p>
+                  </a:txBody>
+                  <a:tcPr/>
+                </a:tc>
+                <a:tc>
+                  <a:txBody>
+                    <a:bodyPr/>
+                    <a:lstStyle/>
+                    <a:p>
+                      <a:r>
+                        <a:rPr lang="en-US" dirty="0" err="1" smtClean="0"/>
+                        <a:t>sdfThing</a:t>
+                      </a:r>
+                      <a:r>
+                        <a:rPr lang="en-US" dirty="0" smtClean="0"/>
+                        <a:t>, </a:t>
+                      </a:r>
+                      <a:r>
+                        <a:rPr lang="en-US" dirty="0" err="1" smtClean="0"/>
+                        <a:t>sdfObject</a:t>
+                      </a:r>
+                      <a:endParaRPr lang="en-US" dirty="0"/>
+                    </a:p>
+                  </a:txBody>
+                  <a:tcPr/>
+                </a:tc>
+              </a:tr>
+              <a:tr h="357569">
+                <a:tc>
+                  <a:txBody>
+                    <a:bodyPr/>
+                    <a:lstStyle/>
+                    <a:p>
+                      <a:pPr marL="0" marR="0" lvl="1" indent="0" algn="l" defTabSz="914400" rtl="0" eaLnBrk="1" fontAlgn="auto" latinLnBrk="0" hangingPunct="1">
+                        <a:lnSpc>
+                          <a:spcPct val="100000"/>
+                        </a:lnSpc>
+                        <a:spcBef>
+                          <a:spcPts val="0"/>
+                        </a:spcBef>
+                        <a:spcAft>
+                          <a:spcPts val="0"/>
+                        </a:spcAft>
+                        <a:buClrTx/>
+                        <a:buSzTx/>
+                        <a:buFontTx/>
+                        <a:buNone/>
+                        <a:tabLst/>
+                        <a:defRPr/>
+                      </a:pPr>
+                      <a:r>
+                        <a:rPr lang="en-US" dirty="0" smtClean="0"/>
+                        <a:t>Variable (type)</a:t>
+                      </a:r>
+                    </a:p>
+                  </a:txBody>
+                  <a:tcPr/>
+                </a:tc>
+                <a:tc>
+                  <a:txBody>
+                    <a:bodyPr/>
+                    <a:lstStyle/>
+                    <a:p>
+                      <a:r>
+                        <a:rPr lang="en-US" dirty="0" err="1" smtClean="0"/>
+                        <a:t>sdfProperty</a:t>
+                      </a:r>
+                      <a:r>
+                        <a:rPr lang="en-US" dirty="0" smtClean="0"/>
+                        <a:t> (</a:t>
+                      </a:r>
+                      <a:r>
+                        <a:rPr lang="en-US" dirty="0" err="1" smtClean="0"/>
+                        <a:t>sdfData</a:t>
+                      </a:r>
+                      <a:r>
+                        <a:rPr lang="en-US" dirty="0" smtClean="0"/>
+                        <a:t>)</a:t>
+                      </a:r>
+                      <a:endParaRPr lang="en-US" dirty="0"/>
+                    </a:p>
+                  </a:txBody>
+                  <a:tcPr/>
+                </a:tc>
+              </a:tr>
+              <a:tr h="357569">
+                <a:tc>
+                  <a:txBody>
+                    <a:bodyPr/>
+                    <a:lstStyle/>
+                    <a:p>
+                      <a:pPr marL="0" marR="0" lvl="1" indent="0" algn="l" defTabSz="914400" rtl="0" eaLnBrk="1" fontAlgn="auto" latinLnBrk="0" hangingPunct="1">
+                        <a:lnSpc>
+                          <a:spcPct val="100000"/>
+                        </a:lnSpc>
+                        <a:spcBef>
+                          <a:spcPts val="0"/>
+                        </a:spcBef>
+                        <a:spcAft>
+                          <a:spcPts val="0"/>
+                        </a:spcAft>
+                        <a:buClrTx/>
+                        <a:buSzTx/>
+                        <a:buFontTx/>
+                        <a:buNone/>
+                        <a:tabLst/>
+                        <a:defRPr/>
+                      </a:pPr>
+                      <a:r>
+                        <a:rPr lang="en-US" dirty="0" smtClean="0"/>
+                        <a:t>Method </a:t>
+                      </a:r>
+                    </a:p>
+                  </a:txBody>
+                  <a:tcPr/>
+                </a:tc>
+                <a:tc>
+                  <a:txBody>
+                    <a:bodyPr/>
+                    <a:lstStyle/>
+                    <a:p>
+                      <a:r>
+                        <a:rPr lang="en-US" dirty="0" err="1" smtClean="0"/>
+                        <a:t>sdfAction</a:t>
+                      </a:r>
+                      <a:endParaRPr lang="en-US" dirty="0"/>
+                    </a:p>
+                  </a:txBody>
+                  <a:tcPr/>
+                </a:tc>
+              </a:tr>
+              <a:tr h="357569">
+                <a:tc>
+                  <a:txBody>
+                    <a:bodyPr/>
+                    <a:lstStyle/>
+                    <a:p>
+                      <a:pPr marL="0" marR="0" lvl="1" indent="0" algn="l" defTabSz="914400" rtl="0" eaLnBrk="1" fontAlgn="auto" latinLnBrk="0" hangingPunct="1">
+                        <a:lnSpc>
+                          <a:spcPct val="100000"/>
+                        </a:lnSpc>
+                        <a:spcBef>
+                          <a:spcPts val="0"/>
+                        </a:spcBef>
+                        <a:spcAft>
+                          <a:spcPts val="0"/>
+                        </a:spcAft>
+                        <a:buClrTx/>
+                        <a:buSzTx/>
+                        <a:buFontTx/>
+                        <a:buNone/>
+                        <a:tabLst/>
+                        <a:defRPr/>
+                      </a:pPr>
+                      <a:r>
+                        <a:rPr lang="en-US" dirty="0" smtClean="0"/>
+                        <a:t>Program </a:t>
+                      </a:r>
+                    </a:p>
+                  </a:txBody>
+                  <a:tcPr/>
+                </a:tc>
+                <a:tc>
+                  <a:txBody>
+                    <a:bodyPr/>
+                    <a:lstStyle/>
+                    <a:p>
+                      <a:pPr marL="0" marR="0" lvl="1" indent="0" algn="l" defTabSz="914400" rtl="0" eaLnBrk="1" fontAlgn="auto" latinLnBrk="0" hangingPunct="1">
+                        <a:lnSpc>
+                          <a:spcPct val="100000"/>
+                        </a:lnSpc>
+                        <a:spcBef>
+                          <a:spcPts val="0"/>
+                        </a:spcBef>
+                        <a:spcAft>
+                          <a:spcPts val="0"/>
+                        </a:spcAft>
+                        <a:buClrTx/>
+                        <a:buSzTx/>
+                        <a:buFontTx/>
+                        <a:buNone/>
+                        <a:tabLst/>
+                        <a:defRPr/>
+                      </a:pPr>
+                      <a:r>
+                        <a:rPr lang="en-US" dirty="0" err="1" smtClean="0"/>
+                        <a:t>sdfAction</a:t>
+                      </a:r>
+                      <a:r>
+                        <a:rPr lang="en-US" dirty="0" smtClean="0"/>
+                        <a:t>, SDF user</a:t>
+                      </a:r>
+                      <a:r>
+                        <a:rPr lang="en-US" baseline="0" dirty="0" smtClean="0"/>
+                        <a:t> defined</a:t>
+                      </a:r>
+                      <a:endParaRPr lang="en-US" dirty="0" smtClean="0"/>
+                    </a:p>
+                  </a:txBody>
+                  <a:tcPr/>
+                </a:tc>
+              </a:tr>
+              <a:tr h="357569">
+                <a:tc>
+                  <a:txBody>
+                    <a:bodyPr/>
+                    <a:lstStyle/>
+                    <a:p>
+                      <a:pPr marL="0" marR="0" lvl="1" indent="0" algn="l" defTabSz="914400" rtl="0" eaLnBrk="1" fontAlgn="auto" latinLnBrk="0" hangingPunct="1">
+                        <a:lnSpc>
+                          <a:spcPct val="100000"/>
+                        </a:lnSpc>
+                        <a:spcBef>
+                          <a:spcPts val="0"/>
+                        </a:spcBef>
+                        <a:spcAft>
+                          <a:spcPts val="0"/>
+                        </a:spcAft>
+                        <a:buClrTx/>
+                        <a:buSzTx/>
+                        <a:buFontTx/>
+                        <a:buNone/>
+                        <a:tabLst/>
+                        <a:defRPr/>
+                      </a:pPr>
+                      <a:r>
+                        <a:rPr lang="en-US" dirty="0" smtClean="0"/>
+                        <a:t>Event/Alarm </a:t>
+                      </a:r>
+                    </a:p>
+                  </a:txBody>
+                  <a:tcPr/>
+                </a:tc>
+                <a:tc>
+                  <a:txBody>
+                    <a:bodyPr/>
+                    <a:lstStyle/>
+                    <a:p>
+                      <a:pPr marL="0" marR="0" lvl="1" indent="0" algn="l" defTabSz="914400" rtl="0" eaLnBrk="1" fontAlgn="auto" latinLnBrk="0" hangingPunct="1">
+                        <a:lnSpc>
+                          <a:spcPct val="100000"/>
+                        </a:lnSpc>
+                        <a:spcBef>
+                          <a:spcPts val="0"/>
+                        </a:spcBef>
+                        <a:spcAft>
+                          <a:spcPts val="0"/>
+                        </a:spcAft>
+                        <a:buClrTx/>
+                        <a:buSzTx/>
+                        <a:buFontTx/>
+                        <a:buNone/>
+                        <a:tabLst/>
+                        <a:defRPr/>
+                      </a:pPr>
+                      <a:r>
+                        <a:rPr lang="en-US" dirty="0" err="1" smtClean="0"/>
+                        <a:t>sdfEvent</a:t>
+                      </a:r>
+                      <a:r>
+                        <a:rPr lang="en-US" dirty="0" smtClean="0"/>
+                        <a:t> + SDF user defined</a:t>
+                      </a:r>
+                    </a:p>
+                  </a:txBody>
+                  <a:tcPr/>
+                </a:tc>
+              </a:tr>
+              <a:tr h="357569">
+                <a:tc>
+                  <a:txBody>
+                    <a:bodyPr/>
+                    <a:lstStyle/>
+                    <a:p>
+                      <a:pPr marL="0" marR="0" lvl="1" indent="0" algn="l" defTabSz="914400" rtl="0" eaLnBrk="1" fontAlgn="auto" latinLnBrk="0" hangingPunct="1">
+                        <a:lnSpc>
+                          <a:spcPct val="100000"/>
+                        </a:lnSpc>
+                        <a:spcBef>
+                          <a:spcPts val="0"/>
+                        </a:spcBef>
+                        <a:spcAft>
+                          <a:spcPts val="0"/>
+                        </a:spcAft>
+                        <a:buClrTx/>
+                        <a:buSzTx/>
+                        <a:buFontTx/>
+                        <a:buNone/>
+                        <a:tabLst/>
+                        <a:defRPr/>
+                      </a:pPr>
+                      <a:r>
+                        <a:rPr lang="en-US" dirty="0" smtClean="0"/>
+                        <a:t>Address space,</a:t>
+                      </a:r>
+                      <a:r>
+                        <a:rPr lang="en-US" baseline="0" dirty="0" smtClean="0"/>
+                        <a:t> </a:t>
+                      </a:r>
+                      <a:r>
+                        <a:rPr lang="en-US" dirty="0" err="1" smtClean="0"/>
+                        <a:t>Nodeset</a:t>
+                      </a:r>
+                      <a:r>
+                        <a:rPr lang="en-US" dirty="0" smtClean="0"/>
+                        <a:t> </a:t>
+                      </a:r>
+                    </a:p>
+                  </a:txBody>
+                  <a:tcPr/>
+                </a:tc>
+                <a:tc>
+                  <a:txBody>
+                    <a:bodyPr/>
+                    <a:lstStyle/>
+                    <a:p>
+                      <a:pPr marL="0" marR="0" lvl="1" indent="0" algn="l" defTabSz="914400" rtl="0" eaLnBrk="1" fontAlgn="auto" latinLnBrk="0" hangingPunct="1">
+                        <a:lnSpc>
+                          <a:spcPct val="100000"/>
+                        </a:lnSpc>
+                        <a:spcBef>
+                          <a:spcPts val="0"/>
+                        </a:spcBef>
+                        <a:spcAft>
+                          <a:spcPts val="0"/>
+                        </a:spcAft>
+                        <a:buClrTx/>
+                        <a:buSzTx/>
+                        <a:buFontTx/>
+                        <a:buNone/>
+                        <a:tabLst/>
+                        <a:defRPr/>
+                      </a:pPr>
+                      <a:r>
+                        <a:rPr lang="en-US" dirty="0" smtClean="0"/>
+                        <a:t>SDF Mapping</a:t>
+                      </a:r>
+                    </a:p>
+                  </a:txBody>
+                  <a:tcPr/>
+                </a:tc>
+              </a:tr>
+              <a:tr h="357569">
+                <a:tc>
+                  <a:txBody>
+                    <a:bodyPr/>
+                    <a:lstStyle/>
+                    <a:p>
+                      <a:pPr marL="0" marR="0" lvl="1" indent="0" algn="l" defTabSz="914400" rtl="0" eaLnBrk="1" fontAlgn="auto" latinLnBrk="0" hangingPunct="1">
+                        <a:lnSpc>
+                          <a:spcPct val="100000"/>
+                        </a:lnSpc>
+                        <a:spcBef>
+                          <a:spcPts val="0"/>
+                        </a:spcBef>
+                        <a:spcAft>
+                          <a:spcPts val="0"/>
+                        </a:spcAft>
+                        <a:buClrTx/>
+                        <a:buSzTx/>
+                        <a:buFontTx/>
+                        <a:buNone/>
+                        <a:tabLst/>
+                        <a:defRPr/>
+                      </a:pPr>
+                      <a:r>
+                        <a:rPr lang="en-US" dirty="0" smtClean="0"/>
+                        <a:t>View </a:t>
+                      </a:r>
+                    </a:p>
+                  </a:txBody>
+                  <a:tcPr/>
+                </a:tc>
+                <a:tc>
+                  <a:txBody>
+                    <a:bodyPr/>
+                    <a:lstStyle/>
+                    <a:p>
+                      <a:pPr marL="0" marR="0" lvl="1" indent="0" algn="l" defTabSz="914400" rtl="0" eaLnBrk="1" fontAlgn="auto" latinLnBrk="0" hangingPunct="1">
+                        <a:lnSpc>
+                          <a:spcPct val="100000"/>
+                        </a:lnSpc>
+                        <a:spcBef>
+                          <a:spcPts val="0"/>
+                        </a:spcBef>
+                        <a:spcAft>
+                          <a:spcPts val="0"/>
+                        </a:spcAft>
+                        <a:buClrTx/>
+                        <a:buSzTx/>
+                        <a:buFontTx/>
+                        <a:buNone/>
+                        <a:tabLst/>
+                        <a:defRPr/>
+                      </a:pPr>
+                      <a:r>
+                        <a:rPr lang="en-US" dirty="0" err="1" smtClean="0"/>
+                        <a:t>sdfThing</a:t>
+                      </a:r>
+                      <a:r>
+                        <a:rPr lang="en-US" dirty="0" smtClean="0"/>
+                        <a:t> + SDF Mapping </a:t>
+                      </a:r>
+                    </a:p>
+                  </a:txBody>
+                  <a:tcPr/>
+                </a:tc>
+              </a:tr>
+              <a:tr h="357569">
+                <a:tc>
+                  <a:txBody>
+                    <a:bodyPr/>
+                    <a:lstStyle/>
+                    <a:p>
+                      <a:pPr marL="0" marR="0" lvl="1" indent="0" algn="l" defTabSz="914400" rtl="0" eaLnBrk="1" fontAlgn="auto" latinLnBrk="0" hangingPunct="1">
+                        <a:lnSpc>
+                          <a:spcPct val="100000"/>
+                        </a:lnSpc>
+                        <a:spcBef>
+                          <a:spcPts val="0"/>
+                        </a:spcBef>
+                        <a:spcAft>
+                          <a:spcPts val="0"/>
+                        </a:spcAft>
+                        <a:buClrTx/>
+                        <a:buSzTx/>
+                        <a:buFontTx/>
+                        <a:buNone/>
+                        <a:tabLst/>
+                        <a:defRPr/>
+                      </a:pPr>
+                      <a:r>
+                        <a:rPr lang="en-US" dirty="0" smtClean="0"/>
+                        <a:t>Reference Type</a:t>
+                      </a:r>
+                    </a:p>
+                  </a:txBody>
+                  <a:tcPr/>
+                </a:tc>
+                <a:tc>
+                  <a:txBody>
+                    <a:bodyPr/>
+                    <a:lstStyle/>
+                    <a:p>
+                      <a:pPr marL="0" marR="0" lvl="1" indent="0" algn="l" defTabSz="914400" rtl="0" eaLnBrk="1" fontAlgn="auto" latinLnBrk="0" hangingPunct="1">
+                        <a:lnSpc>
+                          <a:spcPct val="100000"/>
+                        </a:lnSpc>
+                        <a:spcBef>
+                          <a:spcPts val="0"/>
+                        </a:spcBef>
+                        <a:spcAft>
+                          <a:spcPts val="0"/>
+                        </a:spcAft>
+                        <a:buClrTx/>
+                        <a:buSzTx/>
+                        <a:buFontTx/>
+                        <a:buNone/>
+                        <a:tabLst/>
+                        <a:defRPr/>
+                      </a:pPr>
+                      <a:r>
+                        <a:rPr lang="en-US" dirty="0" err="1" smtClean="0"/>
+                        <a:t>sdfRef</a:t>
+                      </a:r>
+                      <a:r>
+                        <a:rPr lang="en-US" dirty="0" smtClean="0"/>
+                        <a:t>, SDF user typed links</a:t>
+                      </a:r>
+                    </a:p>
+                  </a:txBody>
+                  <a:tcPr/>
+                </a:tc>
+              </a:tr>
+              <a:tr h="357569">
+                <a:tc>
+                  <a:txBody>
+                    <a:bodyPr/>
+                    <a:lstStyle/>
+                    <a:p>
+                      <a:pPr marL="0" marR="0" lvl="1" indent="0" algn="l" defTabSz="914400" rtl="0" eaLnBrk="1" fontAlgn="auto" latinLnBrk="0" hangingPunct="1">
+                        <a:lnSpc>
+                          <a:spcPct val="100000"/>
+                        </a:lnSpc>
+                        <a:spcBef>
+                          <a:spcPts val="0"/>
+                        </a:spcBef>
+                        <a:spcAft>
+                          <a:spcPts val="0"/>
+                        </a:spcAft>
+                        <a:buClrTx/>
+                        <a:buSzTx/>
+                        <a:buFontTx/>
+                        <a:buNone/>
+                        <a:tabLst/>
+                        <a:defRPr/>
+                      </a:pPr>
+                      <a:r>
+                        <a:rPr lang="en-US" dirty="0" smtClean="0"/>
+                        <a:t>Server </a:t>
+                      </a:r>
+                    </a:p>
+                  </a:txBody>
+                  <a:tcPr/>
+                </a:tc>
+                <a:tc>
+                  <a:txBody>
+                    <a:bodyPr/>
+                    <a:lstStyle/>
+                    <a:p>
+                      <a:pPr marL="0" marR="0" lvl="1" indent="0" algn="l" defTabSz="914400" rtl="0" eaLnBrk="1" fontAlgn="auto" latinLnBrk="0" hangingPunct="1">
+                        <a:lnSpc>
+                          <a:spcPct val="100000"/>
+                        </a:lnSpc>
+                        <a:spcBef>
+                          <a:spcPts val="0"/>
+                        </a:spcBef>
+                        <a:spcAft>
+                          <a:spcPts val="0"/>
+                        </a:spcAft>
+                        <a:buClrTx/>
+                        <a:buSzTx/>
+                        <a:buFontTx/>
+                        <a:buNone/>
+                        <a:tabLst/>
+                        <a:defRPr/>
+                      </a:pPr>
+                      <a:r>
+                        <a:rPr lang="en-US" dirty="0" err="1" smtClean="0"/>
+                        <a:t>sdfThing</a:t>
+                      </a:r>
+                      <a:r>
+                        <a:rPr lang="en-US" dirty="0" smtClean="0"/>
+                        <a:t> and Server Objects</a:t>
+                      </a:r>
+                    </a:p>
+                  </a:txBody>
+                  <a:tcPr/>
+                </a:tc>
+              </a:tr>
+            </a:tbl>
+          </a:graphicData>
+        </a:graphic>
+      </p:graphicFrame>
     </p:spTree>
     <p:extLst>
       <p:ext uri="{BB962C8B-B14F-4D97-AF65-F5344CB8AC3E}">
-        <p14:creationId xmlns:p14="http://schemas.microsoft.com/office/powerpoint/2010/main" val="1895435824"/>
+        <p14:creationId xmlns:p14="http://schemas.microsoft.com/office/powerpoint/2010/main" val="72605111"/>
       </p:ext>
     </p:extLst>
   </p:cSld>
@@ -3143,19 +3775,14 @@
             <p:ph type="title"/>
           </p:nvPr>
         </p:nvSpPr>
-        <p:spPr>
-          <a:xfrm>
-            <a:off x="628650" y="164404"/>
-            <a:ext cx="7886700" cy="1325563"/>
-          </a:xfrm>
-        </p:spPr>
+        <p:spPr/>
         <p:txBody>
           <a:bodyPr/>
           <a:lstStyle/>
           <a:p>
             <a:r>
               <a:rPr lang="en-US" dirty="0" smtClean="0"/>
-              <a:t>Models</a:t>
+              <a:t>System Tools and Components</a:t>
             </a:r>
             <a:endParaRPr lang="en-US" dirty="0"/>
           </a:p>
@@ -3171,121 +3798,52 @@
             <p:ph idx="1"/>
           </p:nvPr>
         </p:nvSpPr>
-        <p:spPr>
-          <a:xfrm>
-            <a:off x="628650" y="1345001"/>
-            <a:ext cx="7886700" cy="4486274"/>
-          </a:xfrm>
-        </p:spPr>
+        <p:spPr/>
         <p:txBody>
           <a:bodyPr/>
           <a:lstStyle/>
           <a:p>
-            <a:pPr marL="0" indent="0">
-              <a:buNone/>
-            </a:pPr>
-            <a:r>
-              <a:rPr lang="en-US" dirty="0" smtClean="0"/>
-              <a:t>(SDK Developed)</a:t>
-            </a:r>
-          </a:p>
-          <a:p>
-            <a:r>
-              <a:rPr lang="en-US" dirty="0" smtClean="0"/>
-              <a:t>Control </a:t>
+            <a:r>
+              <a:rPr lang="en-US" dirty="0" smtClean="0"/>
+              <a:t>System design </a:t>
             </a:r>
             <a:r>
               <a:rPr lang="en-US" dirty="0"/>
-              <a:t>system models for PLC </a:t>
-            </a:r>
-            <a:r>
-              <a:rPr lang="en-US" dirty="0" smtClean="0"/>
-              <a:t>functionality</a:t>
-            </a:r>
-          </a:p>
-          <a:p>
-            <a:r>
-              <a:rPr lang="en-US" dirty="0" smtClean="0"/>
-              <a:t>Continuous and batch process control elements</a:t>
+              <a:t>tools and </a:t>
+            </a:r>
+            <a:r>
+              <a:rPr lang="en-US" dirty="0" smtClean="0"/>
+              <a:t>configuration manifest</a:t>
+            </a:r>
+          </a:p>
+          <a:p>
+            <a:r>
+              <a:rPr lang="en-US" dirty="0" smtClean="0"/>
+              <a:t>Control loop and sub-system modeling</a:t>
             </a:r>
             <a:endParaRPr lang="en-US" dirty="0"/>
           </a:p>
           <a:p>
             <a:r>
-              <a:rPr lang="en-US" dirty="0"/>
-              <a:t>State machines, Programmers</a:t>
-            </a:r>
-            <a:r>
-              <a:rPr lang="en-US" dirty="0" smtClean="0"/>
-              <a:t>, </a:t>
-            </a:r>
-            <a:r>
-              <a:rPr lang="en-US" dirty="0"/>
-              <a:t>Sequencers</a:t>
-            </a:r>
-          </a:p>
-          <a:p>
-            <a:r>
-              <a:rPr lang="en-US" dirty="0" smtClean="0"/>
-              <a:t>HMI models</a:t>
-            </a:r>
-          </a:p>
-          <a:p>
-            <a:pPr marL="0" indent="0">
-              <a:buNone/>
-            </a:pPr>
-            <a:r>
-              <a:rPr lang="en-US" dirty="0" smtClean="0"/>
-              <a:t>(Externally sourced)</a:t>
-            </a:r>
-            <a:endParaRPr lang="en-US" dirty="0"/>
-          </a:p>
-          <a:p>
-            <a:r>
-              <a:rPr lang="en-US" dirty="0" smtClean="0"/>
-              <a:t>P&amp;ID process models =&gt; digital twin</a:t>
-            </a:r>
-          </a:p>
-          <a:p>
-            <a:r>
-              <a:rPr lang="en-US" dirty="0" smtClean="0"/>
-              <a:t>Process </a:t>
-            </a:r>
-            <a:r>
-              <a:rPr lang="en-US" dirty="0"/>
-              <a:t>ontologies and vocabularies</a:t>
-            </a:r>
-          </a:p>
-          <a:p>
-            <a:r>
-              <a:rPr lang="en-US" dirty="0"/>
-              <a:t>Control algorithm </a:t>
-            </a:r>
-            <a:r>
-              <a:rPr lang="en-US" dirty="0" smtClean="0"/>
-              <a:t>abstract models</a:t>
-            </a:r>
-            <a:endParaRPr lang="en-US" dirty="0"/>
-          </a:p>
-          <a:p>
-            <a:r>
-              <a:rPr lang="en-US" dirty="0" smtClean="0"/>
-              <a:t>Quantities </a:t>
-            </a:r>
-            <a:r>
-              <a:rPr lang="en-US" dirty="0"/>
-              <a:t>and Units</a:t>
-            </a:r>
-          </a:p>
-          <a:p>
-            <a:endParaRPr lang="en-US" dirty="0"/>
+              <a:rPr lang="en-US" dirty="0" smtClean="0"/>
+              <a:t>Centralized logging and alarms</a:t>
+            </a:r>
+          </a:p>
+          <a:p>
+            <a:r>
+              <a:rPr lang="en-US" dirty="0" smtClean="0"/>
+              <a:t>Digital Twin framework</a:t>
+            </a:r>
+          </a:p>
+          <a:p>
+            <a:endParaRPr lang="en-US" dirty="0" smtClean="0"/>
           </a:p>
         </p:txBody>
       </p:sp>
     </p:spTree>
     <p:extLst>
       <p:ext uri="{BB962C8B-B14F-4D97-AF65-F5344CB8AC3E}">
-        <p14:creationId xmlns:p14="http://schemas.microsoft.com/office/powerpoint/2010/main" val="1166002273"/>
+        <p14:creationId xmlns:p14="http://schemas.microsoft.com/office/powerpoint/2010/main" val="1895435824"/>
       </p:ext>
     </p:extLst>
   </p:cSld>
@@ -3322,14 +3880,19 @@
             <p:ph type="title"/>
           </p:nvPr>
         </p:nvSpPr>
-        <p:spPr/>
+        <p:spPr>
+          <a:xfrm>
+            <a:off x="628650" y="164404"/>
+            <a:ext cx="7886700" cy="1325563"/>
+          </a:xfrm>
+        </p:spPr>
         <p:txBody>
           <a:bodyPr/>
           <a:lstStyle/>
           <a:p>
             <a:r>
               <a:rPr lang="en-US" dirty="0" smtClean="0"/>
-              <a:t>Control System Architecture</a:t>
+              <a:t>Models</a:t>
             </a:r>
             <a:endParaRPr lang="en-US" dirty="0"/>
           </a:p>
@@ -3347,95 +3910,111 @@
         </p:nvSpPr>
         <p:spPr>
           <a:xfrm>
-            <a:off x="628650" y="1512269"/>
-            <a:ext cx="7886700" cy="4351338"/>
+            <a:off x="628650" y="1345001"/>
+            <a:ext cx="7886700" cy="4486274"/>
           </a:xfrm>
         </p:spPr>
         <p:txBody>
           <a:bodyPr/>
           <a:lstStyle/>
           <a:p>
-            <a:r>
-              <a:rPr lang="en-US" dirty="0" smtClean="0"/>
-              <a:t>Embedded module integrations use LWM2M Object links</a:t>
-            </a:r>
-          </a:p>
-          <a:p>
-            <a:r>
-              <a:rPr lang="en-US" dirty="0" smtClean="0"/>
-              <a:t>Pub/Sub - Serial and </a:t>
+            <a:pPr marL="0" indent="0">
+              <a:buNone/>
+            </a:pPr>
+            <a:r>
+              <a:rPr lang="en-US" dirty="0" smtClean="0"/>
+              <a:t>(SDK Developed)</a:t>
+            </a:r>
+          </a:p>
+          <a:p>
+            <a:r>
+              <a:rPr lang="en-US" dirty="0" smtClean="0"/>
+              <a:t>Control </a:t>
             </a:r>
             <a:r>
               <a:rPr lang="en-US" dirty="0"/>
-              <a:t>MQTT </a:t>
-            </a:r>
-            <a:r>
-              <a:rPr lang="en-US" dirty="0" smtClean="0"/>
-              <a:t>bearers initially</a:t>
-            </a:r>
-          </a:p>
-          <a:p>
-            <a:pPr lvl="1"/>
-            <a:r>
-              <a:rPr lang="en-US" dirty="0" err="1" smtClean="0"/>
-              <a:t>LoRA</a:t>
-            </a:r>
+              <a:t>system models for PLC </a:t>
+            </a:r>
+            <a:r>
+              <a:rPr lang="en-US" dirty="0" smtClean="0"/>
+              <a:t>functionality</a:t>
+            </a:r>
+          </a:p>
+          <a:p>
+            <a:r>
+              <a:rPr lang="en-US" dirty="0" smtClean="0"/>
+              <a:t>Continuous and batch process control elements</a:t>
+            </a:r>
+            <a:endParaRPr lang="en-US" dirty="0"/>
+          </a:p>
+          <a:p>
             <a:r>
               <a:rPr lang="en-US" dirty="0"/>
-              <a:t> </a:t>
-            </a:r>
-            <a:r>
-              <a:rPr lang="en-US" dirty="0" smtClean="0"/>
-              <a:t>and USB through serial pub/sub bearer</a:t>
-            </a:r>
-          </a:p>
-          <a:p>
-            <a:pPr lvl="1"/>
-            <a:r>
-              <a:rPr lang="en-US" dirty="0" smtClean="0"/>
-              <a:t>Publisher </a:t>
+              <a:t>State machines, Programmers</a:t>
+            </a:r>
+            <a:r>
+              <a:rPr lang="en-US" dirty="0" smtClean="0"/>
+              <a:t>, </a:t>
             </a:r>
             <a:r>
               <a:rPr lang="en-US" dirty="0"/>
-              <a:t>and Subscriber </a:t>
-            </a:r>
-            <a:r>
-              <a:rPr lang="en-US" dirty="0" smtClean="0"/>
-              <a:t>Modules to customize the communication stack and adapt to Field Buses</a:t>
-            </a:r>
-          </a:p>
-          <a:p>
-            <a:r>
-              <a:rPr lang="en-US" dirty="0" smtClean="0"/>
-              <a:t>Example Transmitter as Sensor + Publisher</a:t>
+              <a:t>Sequencers</a:t>
+            </a:r>
+          </a:p>
+          <a:p>
+            <a:r>
+              <a:rPr lang="en-US" dirty="0" smtClean="0"/>
+              <a:t>HMI models</a:t>
+            </a:r>
+          </a:p>
+          <a:p>
+            <a:pPr marL="0" indent="0">
+              <a:buNone/>
+            </a:pPr>
+            <a:r>
+              <a:rPr lang="en-US" dirty="0" smtClean="0"/>
+              <a:t>(Externally sourced)</a:t>
             </a:r>
             <a:endParaRPr lang="en-US" dirty="0"/>
           </a:p>
           <a:p>
             <a:r>
               <a:rPr lang="en-US" dirty="0" smtClean="0"/>
-              <a:t>Example Controller</a:t>
-            </a:r>
-          </a:p>
-          <a:p>
-            <a:r>
-              <a:rPr lang="en-US" dirty="0" smtClean="0"/>
-              <a:t>Local and </a:t>
-            </a:r>
-            <a:r>
-              <a:rPr lang="en-US" dirty="0" err="1" smtClean="0"/>
-              <a:t>FieldBus</a:t>
-            </a:r>
-            <a:r>
-              <a:rPr lang="en-US" dirty="0" smtClean="0"/>
-              <a:t> integration patterns</a:t>
-            </a:r>
-          </a:p>
-          <a:p>
-            <a:r>
-              <a:rPr lang="en-US" dirty="0" smtClean="0"/>
-              <a:t>System Architecture Example</a:t>
-            </a:r>
+              <a:t>P&amp;ID process models =&gt; digital twin</a:t>
+            </a:r>
+          </a:p>
+          <a:p>
+            <a:r>
+              <a:rPr lang="en-US" dirty="0" smtClean="0"/>
+              <a:t>Process </a:t>
+            </a:r>
+            <a:r>
+              <a:rPr lang="en-US" dirty="0"/>
+              <a:t>ontologies and vocabularies</a:t>
+            </a:r>
+          </a:p>
+          <a:p>
+            <a:r>
+              <a:rPr lang="en-US" dirty="0"/>
+              <a:t>Control algorithm </a:t>
+            </a:r>
+            <a:r>
+              <a:rPr lang="en-US" dirty="0" smtClean="0"/>
+              <a:t>abstract models</a:t>
+            </a:r>
+            <a:endParaRPr lang="en-US" dirty="0"/>
+          </a:p>
+          <a:p>
+            <a:r>
+              <a:rPr lang="en-US" dirty="0" smtClean="0"/>
+              <a:t>Quantities </a:t>
+            </a:r>
+            <a:r>
+              <a:rPr lang="en-US" dirty="0"/>
+              <a:t>and Units</a:t>
+            </a:r>
+          </a:p>
+          <a:p>
             <a:endParaRPr lang="en-US" dirty="0"/>
           </a:p>
         </p:txBody>
@@ -3443,7 +4022,7 @@
     </p:spTree>
     <p:extLst>
       <p:ext uri="{BB962C8B-B14F-4D97-AF65-F5344CB8AC3E}">
-        <p14:creationId xmlns:p14="http://schemas.microsoft.com/office/powerpoint/2010/main" val="964907540"/>
+        <p14:creationId xmlns:p14="http://schemas.microsoft.com/office/powerpoint/2010/main" val="1166002273"/>
       </p:ext>
     </p:extLst>
   </p:cSld>
@@ -3487,15 +4066,98 @@
           <a:p>
             <a:r>
               <a:rPr lang="en-US" dirty="0" smtClean="0"/>
-              <a:t>Integration Patterns </a:t>
-            </a:r>
-            <a:r>
-              <a:rPr lang="mr-IN" dirty="0" smtClean="0"/>
-              <a:t>–</a:t>
-            </a:r>
-            <a:r>
-              <a:rPr lang="en-US" dirty="0" smtClean="0"/>
+              <a:t>Control System Architecture</a:t>
+            </a:r>
+            <a:endParaRPr lang="en-US" dirty="0"/>
+          </a:p>
+        </p:txBody>
+      </p:sp>
+      <p:sp>
+        <p:nvSpPr>
+          <p:cNvPr id="3" name="Content Placeholder 2"/>
+          <p:cNvSpPr>
+            <a:spLocks noGrp="1"/>
+          </p:cNvSpPr>
+          <p:nvPr>
+            <p:ph idx="1"/>
+          </p:nvPr>
+        </p:nvSpPr>
+        <p:spPr>
+          <a:xfrm>
+            <a:off x="628650" y="1512269"/>
+            <a:ext cx="7886700" cy="4351338"/>
+          </a:xfrm>
+        </p:spPr>
+        <p:txBody>
+          <a:bodyPr/>
+          <a:lstStyle/>
+          <a:p>
+            <a:r>
+              <a:rPr lang="en-US" dirty="0" smtClean="0"/>
+              <a:t>Embedded module integrations use LWM2M Object links</a:t>
+            </a:r>
+          </a:p>
+          <a:p>
+            <a:r>
+              <a:rPr lang="en-US" dirty="0" smtClean="0"/>
+              <a:t>Pub/Sub - Serial and </a:t>
+            </a:r>
+            <a:r>
+              <a:rPr lang="en-US" dirty="0"/>
+              <a:t>MQTT </a:t>
+            </a:r>
+            <a:r>
+              <a:rPr lang="en-US" dirty="0" smtClean="0"/>
+              <a:t>bearers initially</a:t>
+            </a:r>
+          </a:p>
+          <a:p>
+            <a:pPr lvl="1"/>
+            <a:r>
+              <a:rPr lang="en-US" dirty="0" err="1" smtClean="0"/>
+              <a:t>LoRA</a:t>
+            </a:r>
+            <a:r>
+              <a:rPr lang="en-US" dirty="0"/>
               <a:t> </a:t>
+            </a:r>
+            <a:r>
+              <a:rPr lang="en-US" dirty="0" smtClean="0"/>
+              <a:t>and USB through serial pub/sub bearer</a:t>
+            </a:r>
+          </a:p>
+          <a:p>
+            <a:pPr lvl="1"/>
+            <a:r>
+              <a:rPr lang="en-US" dirty="0" smtClean="0"/>
+              <a:t>Publisher </a:t>
+            </a:r>
+            <a:r>
+              <a:rPr lang="en-US" dirty="0"/>
+              <a:t>and Subscriber </a:t>
+            </a:r>
+            <a:r>
+              <a:rPr lang="en-US" dirty="0" smtClean="0"/>
+              <a:t>Modules to customize the communication stack and adapt to Field Buses</a:t>
+            </a:r>
+          </a:p>
+          <a:p>
+            <a:r>
+              <a:rPr lang="en-US" dirty="0" smtClean="0"/>
+              <a:t>Example Transmitter as Sensor + Publisher</a:t>
+            </a:r>
+            <a:endParaRPr lang="en-US" dirty="0"/>
+          </a:p>
+          <a:p>
+            <a:r>
+              <a:rPr lang="en-US" dirty="0" smtClean="0"/>
+              <a:t>Example Controller</a:t>
+            </a:r>
+          </a:p>
+          <a:p>
+            <a:r>
+              <a:rPr lang="en-US" dirty="0" smtClean="0"/>
+              <a:t>Local and </a:t>
             </a:r>
             <a:r>
               <a:rPr lang="en-US" dirty="0" err="1" smtClean="0"/>
@@ -3503,537 +4165,13 @@
             </a:r>
             <a:r>
               <a:rPr lang="en-US" dirty="0" smtClean="0"/>
-              <a:t>  </a:t>
-            </a:r>
-            <a:endParaRPr lang="en-US" dirty="0"/>
-          </a:p>
-        </p:txBody>
-      </p:sp>
-      <p:sp>
-        <p:nvSpPr>
-          <p:cNvPr id="4" name="Rectangle 3"/>
-          <p:cNvSpPr/>
-          <p:nvPr/>
-        </p:nvSpPr>
-        <p:spPr>
-          <a:xfrm>
-            <a:off x="2475572" y="2236807"/>
-            <a:ext cx="1182028" cy="914400"/>
-          </a:xfrm>
-          <a:prstGeom prst="rect">
-            <a:avLst/>
-          </a:prstGeom>
-          <a:solidFill>
-            <a:schemeClr val="accent1"/>
-          </a:solidFill>
-          <a:ln w="28575">
-            <a:solidFill>
-              <a:schemeClr val="accent1"/>
-            </a:solidFill>
-          </a:ln>
-        </p:spPr>
-        <p:style>
-          <a:lnRef idx="2">
-            <a:schemeClr val="accent1">
-              <a:shade val="50000"/>
-            </a:schemeClr>
-          </a:lnRef>
-          <a:fillRef idx="1">
-            <a:schemeClr val="accent1"/>
-          </a:fillRef>
-          <a:effectRef idx="0">
-            <a:schemeClr val="accent1"/>
-          </a:effectRef>
-          <a:fontRef idx="minor">
-            <a:schemeClr val="lt1"/>
-          </a:fontRef>
-        </p:style>
-        <p:txBody>
-          <a:bodyPr rtlCol="0" anchor="ctr"/>
-          <a:lstStyle/>
-          <a:p>
-            <a:pPr algn="ctr"/>
-            <a:r>
-              <a:rPr lang="en-US" dirty="0" smtClean="0">
-                <a:solidFill>
-                  <a:schemeClr val="bg1"/>
-                </a:solidFill>
-              </a:rPr>
-              <a:t>Sensor</a:t>
-            </a:r>
-            <a:endParaRPr lang="en-US" dirty="0">
-              <a:solidFill>
-                <a:schemeClr val="bg1"/>
-              </a:solidFill>
-            </a:endParaRPr>
-          </a:p>
-        </p:txBody>
-      </p:sp>
-      <p:sp>
-        <p:nvSpPr>
-          <p:cNvPr id="5" name="Rectangle 4"/>
-          <p:cNvSpPr/>
-          <p:nvPr/>
-        </p:nvSpPr>
-        <p:spPr>
-          <a:xfrm>
-            <a:off x="3791415" y="2236807"/>
-            <a:ext cx="1167161" cy="914400"/>
-          </a:xfrm>
-          <a:prstGeom prst="rect">
-            <a:avLst/>
-          </a:prstGeom>
-          <a:solidFill>
-            <a:schemeClr val="accent1"/>
-          </a:solidFill>
-          <a:ln w="28575">
-            <a:solidFill>
-              <a:schemeClr val="accent1"/>
-            </a:solidFill>
-          </a:ln>
-        </p:spPr>
-        <p:style>
-          <a:lnRef idx="2">
-            <a:schemeClr val="accent1">
-              <a:shade val="50000"/>
-            </a:schemeClr>
-          </a:lnRef>
-          <a:fillRef idx="1">
-            <a:schemeClr val="accent1"/>
-          </a:fillRef>
-          <a:effectRef idx="0">
-            <a:schemeClr val="accent1"/>
-          </a:effectRef>
-          <a:fontRef idx="minor">
-            <a:schemeClr val="lt1"/>
-          </a:fontRef>
-        </p:style>
-        <p:txBody>
-          <a:bodyPr rtlCol="0" anchor="ctr"/>
-          <a:lstStyle/>
-          <a:p>
-            <a:pPr algn="ctr"/>
-            <a:r>
-              <a:rPr lang="en-US" dirty="0" smtClean="0">
-                <a:solidFill>
-                  <a:schemeClr val="bg1"/>
-                </a:solidFill>
-              </a:rPr>
-              <a:t>Publisher</a:t>
-            </a:r>
-            <a:endParaRPr lang="en-US" dirty="0">
-              <a:solidFill>
-                <a:schemeClr val="bg1"/>
-              </a:solidFill>
-            </a:endParaRPr>
-          </a:p>
-        </p:txBody>
-      </p:sp>
-      <p:cxnSp>
-        <p:nvCxnSpPr>
-          <p:cNvPr id="7" name="Straight Arrow Connector 6"/>
-          <p:cNvCxnSpPr/>
-          <p:nvPr/>
-        </p:nvCxnSpPr>
-        <p:spPr>
-          <a:xfrm>
-            <a:off x="4958576" y="2694007"/>
-            <a:ext cx="1059366" cy="0"/>
-          </a:xfrm>
-          <a:prstGeom prst="straightConnector1">
-            <a:avLst/>
-          </a:prstGeom>
-          <a:ln w="28575">
-            <a:solidFill>
-              <a:schemeClr val="accent1"/>
-            </a:solidFill>
-            <a:tailEnd type="triangle"/>
-          </a:ln>
-        </p:spPr>
-        <p:style>
-          <a:lnRef idx="1">
-            <a:schemeClr val="accent1"/>
-          </a:lnRef>
-          <a:fillRef idx="0">
-            <a:schemeClr val="accent1"/>
-          </a:fillRef>
-          <a:effectRef idx="0">
-            <a:schemeClr val="accent1"/>
-          </a:effectRef>
-          <a:fontRef idx="minor">
-            <a:schemeClr val="tx1"/>
-          </a:fontRef>
-        </p:style>
-      </p:cxnSp>
-      <p:sp>
-        <p:nvSpPr>
-          <p:cNvPr id="8" name="Rectangle 7"/>
-          <p:cNvSpPr/>
-          <p:nvPr/>
-        </p:nvSpPr>
-        <p:spPr>
-          <a:xfrm>
-            <a:off x="4205990" y="4131842"/>
-            <a:ext cx="1182028" cy="914400"/>
-          </a:xfrm>
-          <a:prstGeom prst="rect">
-            <a:avLst/>
-          </a:prstGeom>
-          <a:solidFill>
-            <a:schemeClr val="accent1"/>
-          </a:solidFill>
-          <a:ln w="28575">
-            <a:solidFill>
-              <a:schemeClr val="accent1"/>
-            </a:solidFill>
-          </a:ln>
-        </p:spPr>
-        <p:style>
-          <a:lnRef idx="2">
-            <a:schemeClr val="accent1">
-              <a:shade val="50000"/>
-            </a:schemeClr>
-          </a:lnRef>
-          <a:fillRef idx="1">
-            <a:schemeClr val="accent1"/>
-          </a:fillRef>
-          <a:effectRef idx="0">
-            <a:schemeClr val="accent1"/>
-          </a:effectRef>
-          <a:fontRef idx="minor">
-            <a:schemeClr val="lt1"/>
-          </a:fontRef>
-        </p:style>
-        <p:txBody>
-          <a:bodyPr rtlCol="0" anchor="ctr"/>
-          <a:lstStyle/>
-          <a:p>
-            <a:pPr algn="ctr"/>
-            <a:r>
-              <a:rPr lang="en-US" dirty="0" smtClean="0">
-                <a:solidFill>
-                  <a:schemeClr val="bg1"/>
-                </a:solidFill>
-              </a:rPr>
-              <a:t>Subscriber</a:t>
-            </a:r>
-            <a:endParaRPr lang="en-US" dirty="0">
-              <a:solidFill>
-                <a:schemeClr val="bg1"/>
-              </a:solidFill>
-            </a:endParaRPr>
-          </a:p>
-        </p:txBody>
-      </p:sp>
-      <p:sp>
-        <p:nvSpPr>
-          <p:cNvPr id="9" name="Rectangle 8"/>
-          <p:cNvSpPr/>
-          <p:nvPr/>
-        </p:nvSpPr>
-        <p:spPr>
-          <a:xfrm>
-            <a:off x="5521833" y="4131842"/>
-            <a:ext cx="1167161" cy="914400"/>
-          </a:xfrm>
-          <a:prstGeom prst="rect">
-            <a:avLst/>
-          </a:prstGeom>
-          <a:solidFill>
-            <a:schemeClr val="accent1"/>
-          </a:solidFill>
-          <a:ln w="28575">
-            <a:solidFill>
-              <a:schemeClr val="accent1"/>
-            </a:solidFill>
-          </a:ln>
-        </p:spPr>
-        <p:style>
-          <a:lnRef idx="2">
-            <a:schemeClr val="accent1">
-              <a:shade val="50000"/>
-            </a:schemeClr>
-          </a:lnRef>
-          <a:fillRef idx="1">
-            <a:schemeClr val="accent1"/>
-          </a:fillRef>
-          <a:effectRef idx="0">
-            <a:schemeClr val="accent1"/>
-          </a:effectRef>
-          <a:fontRef idx="minor">
-            <a:schemeClr val="lt1"/>
-          </a:fontRef>
-        </p:style>
-        <p:txBody>
-          <a:bodyPr rtlCol="0" anchor="ctr"/>
-          <a:lstStyle/>
-          <a:p>
-            <a:pPr algn="ctr"/>
-            <a:r>
-              <a:rPr lang="en-US" dirty="0" smtClean="0">
-                <a:solidFill>
-                  <a:schemeClr val="bg1"/>
-                </a:solidFill>
-              </a:rPr>
-              <a:t>Actuator</a:t>
-            </a:r>
-            <a:endParaRPr lang="en-US" dirty="0">
-              <a:solidFill>
-                <a:schemeClr val="bg1"/>
-              </a:solidFill>
-            </a:endParaRPr>
-          </a:p>
-        </p:txBody>
-      </p:sp>
-      <p:cxnSp>
-        <p:nvCxnSpPr>
-          <p:cNvPr id="10" name="Straight Arrow Connector 9"/>
-          <p:cNvCxnSpPr/>
-          <p:nvPr/>
-        </p:nvCxnSpPr>
-        <p:spPr>
-          <a:xfrm>
-            <a:off x="3068564" y="4589042"/>
-            <a:ext cx="1137426" cy="0"/>
-          </a:xfrm>
-          <a:prstGeom prst="straightConnector1">
-            <a:avLst/>
-          </a:prstGeom>
-          <a:ln w="28575">
-            <a:solidFill>
-              <a:schemeClr val="accent1"/>
-            </a:solidFill>
-            <a:tailEnd type="triangle"/>
-          </a:ln>
-        </p:spPr>
-        <p:style>
-          <a:lnRef idx="1">
-            <a:schemeClr val="accent1"/>
-          </a:lnRef>
-          <a:fillRef idx="0">
-            <a:schemeClr val="accent1"/>
-          </a:fillRef>
-          <a:effectRef idx="0">
-            <a:schemeClr val="accent1"/>
-          </a:effectRef>
-          <a:fontRef idx="minor">
-            <a:schemeClr val="tx1"/>
-          </a:fontRef>
-        </p:style>
-      </p:cxnSp>
-      <p:sp>
-        <p:nvSpPr>
-          <p:cNvPr id="18" name="Rectangle 17"/>
-          <p:cNvSpPr/>
-          <p:nvPr/>
-        </p:nvSpPr>
-        <p:spPr>
-          <a:xfrm>
-            <a:off x="2308303" y="2074824"/>
-            <a:ext cx="2843560" cy="1238366"/>
-          </a:xfrm>
-          <a:prstGeom prst="rect">
-            <a:avLst/>
-          </a:prstGeom>
-          <a:noFill/>
-          <a:ln w="28575">
-            <a:solidFill>
-              <a:schemeClr val="accent1"/>
-            </a:solidFill>
-            <a:prstDash val="lgDash"/>
-          </a:ln>
-        </p:spPr>
-        <p:style>
-          <a:lnRef idx="2">
-            <a:schemeClr val="accent1">
-              <a:shade val="50000"/>
-            </a:schemeClr>
-          </a:lnRef>
-          <a:fillRef idx="1">
-            <a:schemeClr val="accent1"/>
-          </a:fillRef>
-          <a:effectRef idx="0">
-            <a:schemeClr val="accent1"/>
-          </a:effectRef>
-          <a:fontRef idx="minor">
-            <a:schemeClr val="lt1"/>
-          </a:fontRef>
-        </p:style>
-        <p:txBody>
-          <a:bodyPr rtlCol="0" anchor="ctr"/>
-          <a:lstStyle/>
-          <a:p>
-            <a:pPr algn="ctr"/>
-            <a:endParaRPr lang="en-US" dirty="0">
-              <a:solidFill>
-                <a:schemeClr val="tx1"/>
-              </a:solidFill>
-            </a:endParaRPr>
-          </a:p>
-        </p:txBody>
-      </p:sp>
-      <p:sp>
-        <p:nvSpPr>
-          <p:cNvPr id="19" name="Rectangle 18"/>
-          <p:cNvSpPr/>
-          <p:nvPr/>
-        </p:nvSpPr>
-        <p:spPr>
-          <a:xfrm>
-            <a:off x="4038721" y="3969859"/>
-            <a:ext cx="2843560" cy="1238366"/>
-          </a:xfrm>
-          <a:prstGeom prst="rect">
-            <a:avLst/>
-          </a:prstGeom>
-          <a:noFill/>
-          <a:ln w="28575">
-            <a:solidFill>
-              <a:schemeClr val="accent1"/>
-            </a:solidFill>
-            <a:prstDash val="lgDash"/>
-          </a:ln>
-        </p:spPr>
-        <p:style>
-          <a:lnRef idx="2">
-            <a:schemeClr val="accent1">
-              <a:shade val="50000"/>
-            </a:schemeClr>
-          </a:lnRef>
-          <a:fillRef idx="1">
-            <a:schemeClr val="accent1"/>
-          </a:fillRef>
-          <a:effectRef idx="0">
-            <a:schemeClr val="accent1"/>
-          </a:effectRef>
-          <a:fontRef idx="minor">
-            <a:schemeClr val="lt1"/>
-          </a:fontRef>
-        </p:style>
-        <p:txBody>
-          <a:bodyPr rtlCol="0" anchor="ctr"/>
-          <a:lstStyle/>
-          <a:p>
-            <a:pPr algn="ctr"/>
-            <a:endParaRPr lang="en-US" dirty="0">
-              <a:solidFill>
-                <a:schemeClr val="tx1"/>
-              </a:solidFill>
-            </a:endParaRPr>
-          </a:p>
-        </p:txBody>
-      </p:sp>
-      <p:sp>
-        <p:nvSpPr>
-          <p:cNvPr id="20" name="Rectangle 19"/>
-          <p:cNvSpPr/>
-          <p:nvPr/>
-        </p:nvSpPr>
-        <p:spPr>
-          <a:xfrm>
-            <a:off x="6017942" y="2509341"/>
-            <a:ext cx="970137" cy="369332"/>
-          </a:xfrm>
-          <a:prstGeom prst="rect">
-            <a:avLst/>
-          </a:prstGeom>
-        </p:spPr>
-        <p:txBody>
-          <a:bodyPr wrap="none">
-            <a:spAutoFit/>
-          </a:bodyPr>
-          <a:lstStyle/>
-          <a:p>
-            <a:r>
-              <a:rPr lang="en-US" smtClean="0"/>
-              <a:t>FieldBus</a:t>
-            </a:r>
-            <a:endParaRPr lang="en-US" dirty="0"/>
-          </a:p>
-        </p:txBody>
-      </p:sp>
-      <p:sp>
-        <p:nvSpPr>
-          <p:cNvPr id="22" name="Rectangle 21"/>
-          <p:cNvSpPr/>
-          <p:nvPr/>
-        </p:nvSpPr>
-        <p:spPr>
-          <a:xfrm>
-            <a:off x="2681751" y="1617625"/>
-            <a:ext cx="2096664" cy="369332"/>
-          </a:xfrm>
-          <a:prstGeom prst="rect">
-            <a:avLst/>
-          </a:prstGeom>
-        </p:spPr>
-        <p:txBody>
-          <a:bodyPr wrap="none">
-            <a:spAutoFit/>
-          </a:bodyPr>
-          <a:lstStyle/>
-          <a:p>
-            <a:r>
-              <a:rPr lang="en-US" smtClean="0"/>
-              <a:t>Fieldbus Transmitter</a:t>
-            </a:r>
-            <a:endParaRPr lang="en-US" dirty="0"/>
-          </a:p>
-        </p:txBody>
-      </p:sp>
-      <p:sp>
-        <p:nvSpPr>
-          <p:cNvPr id="23" name="Rectangle 22"/>
-          <p:cNvSpPr/>
-          <p:nvPr/>
-        </p:nvSpPr>
-        <p:spPr>
-          <a:xfrm>
-            <a:off x="2096449" y="4404376"/>
-            <a:ext cx="970137" cy="369332"/>
-          </a:xfrm>
-          <a:prstGeom prst="rect">
-            <a:avLst/>
-          </a:prstGeom>
-        </p:spPr>
-        <p:txBody>
-          <a:bodyPr wrap="none">
-            <a:spAutoFit/>
-          </a:bodyPr>
-          <a:lstStyle/>
-          <a:p>
-            <a:r>
-              <a:rPr lang="en-US" smtClean="0"/>
-              <a:t>FieldBus</a:t>
-            </a:r>
-            <a:endParaRPr lang="en-US" dirty="0"/>
-          </a:p>
-        </p:txBody>
-      </p:sp>
-      <p:sp>
-        <p:nvSpPr>
-          <p:cNvPr id="24" name="Rectangle 23"/>
-          <p:cNvSpPr/>
-          <p:nvPr/>
-        </p:nvSpPr>
-        <p:spPr>
-          <a:xfrm>
-            <a:off x="4550412" y="3563041"/>
-            <a:ext cx="1820178" cy="369332"/>
-          </a:xfrm>
-          <a:prstGeom prst="rect">
-            <a:avLst/>
-          </a:prstGeom>
-        </p:spPr>
-        <p:txBody>
-          <a:bodyPr wrap="none">
-            <a:spAutoFit/>
-          </a:bodyPr>
-          <a:lstStyle/>
-          <a:p>
-            <a:r>
-              <a:rPr lang="en-US" smtClean="0"/>
-              <a:t>Fieldbus Receiver</a:t>
+              <a:t> integration patterns</a:t>
+            </a:r>
+          </a:p>
+          <a:p>
+            <a:r>
+              <a:rPr lang="en-US" dirty="0" smtClean="0"/>
+              <a:t>System Architecture Example</a:t>
             </a:r>
             <a:endParaRPr lang="en-US" dirty="0"/>
           </a:p>
@@ -4042,7 +4180,7 @@
     </p:spTree>
     <p:extLst>
       <p:ext uri="{BB962C8B-B14F-4D97-AF65-F5344CB8AC3E}">
-        <p14:creationId xmlns:p14="http://schemas.microsoft.com/office/powerpoint/2010/main" val="1443892791"/>
+        <p14:creationId xmlns:p14="http://schemas.microsoft.com/office/powerpoint/2010/main" val="964907540"/>
       </p:ext>
     </p:extLst>
   </p:cSld>
@@ -4079,23 +4217,30 @@
             <p:ph type="title"/>
           </p:nvPr>
         </p:nvSpPr>
-        <p:spPr>
-          <a:xfrm>
-            <a:off x="628650" y="365126"/>
-            <a:ext cx="7032238" cy="1325563"/>
-          </a:xfrm>
-        </p:spPr>
+        <p:spPr/>
         <p:txBody>
           <a:bodyPr/>
           <a:lstStyle/>
           <a:p>
             <a:r>
-              <a:rPr lang="en-US" smtClean="0"/>
-              <a:t>Integration Patterns - Modular </a:t>
-            </a:r>
-            <a:r>
-              <a:rPr lang="en-US" dirty="0" smtClean="0"/>
-              <a:t>Controller Example </a:t>
+              <a:rPr lang="en-US" dirty="0" smtClean="0"/>
+              <a:t>Integration Patterns </a:t>
+            </a:r>
+            <a:r>
+              <a:rPr lang="mr-IN" dirty="0" smtClean="0"/>
+              <a:t>–</a:t>
+            </a:r>
+            <a:r>
+              <a:rPr lang="en-US" dirty="0" smtClean="0"/>
+              <a:t> </a:t>
+            </a:r>
+            <a:r>
+              <a:rPr lang="en-US" dirty="0" err="1" smtClean="0"/>
+              <a:t>FieldBus</a:t>
+            </a:r>
+            <a:r>
+              <a:rPr lang="en-US" dirty="0" smtClean="0"/>
+              <a:t>  </a:t>
             </a:r>
             <a:endParaRPr lang="en-US" dirty="0"/>
           </a:p>
@@ -4109,7 +4254,7 @@
         </p:nvSpPr>
         <p:spPr>
           <a:xfrm>
-            <a:off x="3200401" y="2549041"/>
+            <a:off x="2475572" y="2236807"/>
             <a:ext cx="1182028" cy="914400"/>
           </a:xfrm>
           <a:prstGeom prst="rect">
@@ -4151,7 +4296,7 @@
                   <a:schemeClr val="bg1"/>
                 </a:solidFill>
               </a:rPr>
-              <a:t>Input</a:t>
+              <a:t>Sensor</a:t>
             </a:r>
             <a:endParaRPr lang="en-US" dirty="0">
               <a:solidFill>
@@ -4169,7 +4314,7 @@
         </p:nvSpPr>
         <p:spPr>
           <a:xfrm>
-            <a:off x="4516244" y="2549041"/>
+            <a:off x="3791415" y="2236807"/>
             <a:ext cx="1167161" cy="914400"/>
           </a:xfrm>
           <a:prstGeom prst="rect">
@@ -4211,7 +4356,7 @@
                   <a:schemeClr val="bg1"/>
                 </a:solidFill>
               </a:rPr>
-              <a:t>Output</a:t>
+              <a:t>Publisher</a:t>
             </a:r>
             <a:endParaRPr lang="en-US" dirty="0">
               <a:solidFill>
@@ -4221,6 +4366,198 @@
           </a:p>
         </p:txBody>
       </p:sp>
+      <p:cxnSp>
+        <p:nvCxnSpPr>
+          <p:cNvPr id="7" name="Straight Arrow Connector 6"/>
+          <p:cNvCxnSpPr/>
+          <p:nvPr/>
+        </p:nvCxnSpPr>
+        <p:spPr>
+          <a:xfrm>
+            <a:off x="4958576" y="2694007"/>
+            <a:ext cx="1059366" cy="0"/>
+          </a:xfrm>
+          <a:prstGeom prst="straightConnector1">
+            <a:avLst/>
+          </a:prstGeom>
+          <a:ln w="28575">
+            <a:solidFill>
+              <a:schemeClr val="accent1"/>
+            </a:solidFill>
+            <a:tailEnd type="triangle"/>
+          </a:ln>
+        </p:spPr>
+        <p:style>
+          <a:lnRef idx="1">
+            <a:schemeClr val="accent1"/>
+          </a:lnRef>
+          <a:fillRef idx="0">
+            <a:schemeClr val="accent1"/>
+          </a:fillRef>
+          <a:effectRef idx="0">
+            <a:schemeClr val="accent1"/>
+          </a:effectRef>
+          <a:fontRef idx="minor">
+            <a:schemeClr val="tx1"/>
+          </a:fontRef>
+        </p:style>
+      </p:cxnSp>
+      <p:sp>
+        <p:nvSpPr>
+          <p:cNvPr id="8" name="Rectangle 7"/>
+          <p:cNvSpPr/>
+          <p:nvPr/>
+        </p:nvSpPr>
+        <p:spPr>
+          <a:xfrm>
+            <a:off x="4205990" y="4131842"/>
+            <a:ext cx="1182028" cy="914400"/>
+          </a:xfrm>
+          <a:prstGeom prst="rect">
+            <a:avLst/>
+          </a:prstGeom>
+          <a:solidFill>
+            <a:schemeClr val="accent1"/>
+          </a:solidFill>
+          <a:ln w="28575">
+            <a:solidFill>
+              <a:schemeClr val="accent1"/>
+            </a:solidFill>
+          </a:ln>
+        </p:spPr>
+        <p:style>
+          <a:lnRef idx="2">
+            <a:schemeClr val="accent1">
+              <a:shade val="50000"/>
+            </a:schemeClr>
+          </a:lnRef>
+          <a:fillRef idx="1">
+            <a:schemeClr val="accent1"/>
+          </a:fillRef>
+          <a:effectRef idx="0">
+            <a:schemeClr val="accent1"/>
+          </a:effectRef>
+          <a:fontRef idx="minor">
+            <a:schemeClr val="lt1"/>
+          </a:fontRef>
+        </p:style>
+        <p:txBody>
+          <a:bodyPr rtlCol="0" anchor="ctr"/>
+          <a:lstStyle/>
+          <a:p>
+            <a:pPr algn="ctr"/>
+            <a:r>
+              <a:rPr lang="en-US" dirty="0" smtClean="0">
+                <a:solidFill>
+                  <a:schemeClr val="bg1"/>
+                </a:solidFill>
+              </a:rPr>
+              <a:t>Subscriber</a:t>
+            </a:r>
+            <a:endParaRPr lang="en-US" dirty="0">
+              <a:solidFill>
+                <a:schemeClr val="bg1"/>
+              </a:solidFill>
+            </a:endParaRPr>
+          </a:p>
+        </p:txBody>
+      </p:sp>
+      <p:sp>
+        <p:nvSpPr>
+          <p:cNvPr id="9" name="Rectangle 8"/>
+          <p:cNvSpPr/>
+          <p:nvPr/>
+        </p:nvSpPr>
+        <p:spPr>
+          <a:xfrm>
+            <a:off x="5521833" y="4131842"/>
+            <a:ext cx="1167161" cy="914400"/>
+          </a:xfrm>
+          <a:prstGeom prst="rect">
+            <a:avLst/>
+          </a:prstGeom>
+          <a:solidFill>
+            <a:schemeClr val="accent1"/>
+          </a:solidFill>
+          <a:ln w="28575">
+            <a:solidFill>
+              <a:schemeClr val="accent1"/>
+            </a:solidFill>
+          </a:ln>
+        </p:spPr>
+        <p:style>
+          <a:lnRef idx="2">
+            <a:schemeClr val="accent1">
+              <a:shade val="50000"/>
+            </a:schemeClr>
+          </a:lnRef>
+          <a:fillRef idx="1">
+            <a:schemeClr val="accent1"/>
+          </a:fillRef>
+          <a:effectRef idx="0">
+            <a:schemeClr val="accent1"/>
+          </a:effectRef>
+          <a:fontRef idx="minor">
+            <a:schemeClr val="lt1"/>
+          </a:fontRef>
+        </p:style>
+        <p:txBody>
+          <a:bodyPr rtlCol="0" anchor="ctr"/>
+          <a:lstStyle/>
+          <a:p>
+            <a:pPr algn="ctr"/>
+            <a:r>
+              <a:rPr lang="en-US" dirty="0" smtClean="0">
+                <a:solidFill>
+                  <a:schemeClr val="bg1"/>
+                </a:solidFill>
+              </a:rPr>
+              <a:t>Actuator</a:t>
+            </a:r>
+            <a:endParaRPr lang="en-US" dirty="0">
+              <a:solidFill>
+                <a:schemeClr val="bg1"/>
+              </a:solidFill>
+            </a:endParaRPr>
+          </a:p>
+        </p:txBody>
+      </p:sp>
+      <p:cxnSp>
+        <p:nvCxnSpPr>
+          <p:cNvPr id="10" name="Straight Arrow Connector 9"/>
+          <p:cNvCxnSpPr/>
+          <p:nvPr/>
+        </p:nvCxnSpPr>
+        <p:spPr>
+          <a:xfrm>
+            <a:off x="3068564" y="4589042"/>
+            <a:ext cx="1137426" cy="0"/>
+          </a:xfrm>
+          <a:prstGeom prst="straightConnector1">
+            <a:avLst/>
+          </a:prstGeom>
+          <a:ln w="28575">
+            <a:solidFill>
+              <a:schemeClr val="accent1"/>
+            </a:solidFill>
+            <a:tailEnd type="triangle"/>
+          </a:ln>
+        </p:spPr>
+        <p:style>
+          <a:lnRef idx="1">
+            <a:schemeClr val="accent1"/>
+          </a:lnRef>
+          <a:fillRef idx="0">
+            <a:schemeClr val="accent1"/>
+          </a:fillRef>
+          <a:effectRef idx="0">
+            <a:schemeClr val="accent1"/>
+          </a:effectRef>
+          <a:fontRef idx="minor">
+            <a:schemeClr val="tx1"/>
+          </a:fontRef>
+        </p:style>
+      </p:cxnSp>
       <p:sp>
         <p:nvSpPr>
           <p:cNvPr id="18" name="Rectangle 17"/>
@@ -4229,8 +4566,8 @@
         </p:nvSpPr>
         <p:spPr>
           <a:xfrm>
-            <a:off x="3033132" y="2387058"/>
-            <a:ext cx="2832409" cy="2341060"/>
+            <a:off x="2308303" y="2074824"/>
+            <a:ext cx="2843560" cy="1238366"/>
           </a:xfrm>
           <a:prstGeom prst="rect">
             <a:avLst/>
@@ -4274,54 +4611,24 @@
       </p:sp>
       <p:sp>
         <p:nvSpPr>
-          <p:cNvPr id="22" name="Rectangle 21"/>
+          <p:cNvPr id="19" name="Rectangle 18"/>
           <p:cNvSpPr/>
           <p:nvPr/>
         </p:nvSpPr>
         <p:spPr>
           <a:xfrm>
-            <a:off x="3791415" y="1943182"/>
-            <a:ext cx="1126270" cy="369332"/>
+            <a:off x="4038721" y="3969859"/>
+            <a:ext cx="2843560" cy="1238366"/>
           </a:xfrm>
           <a:prstGeom prst="rect">
             <a:avLst/>
           </a:prstGeom>
-        </p:spPr>
-        <p:txBody>
-          <a:bodyPr wrap="none">
-            <a:spAutoFit/>
-          </a:bodyPr>
-          <a:lstStyle/>
-          <a:p>
-            <a:r>
-              <a:rPr lang="en-US" smtClean="0"/>
-              <a:t>Controller</a:t>
-            </a:r>
-            <a:endParaRPr lang="en-US" dirty="0"/>
-          </a:p>
-        </p:txBody>
-      </p:sp>
-      <p:sp>
-        <p:nvSpPr>
-          <p:cNvPr id="16" name="Rectangle 15"/>
-          <p:cNvSpPr/>
-          <p:nvPr/>
-        </p:nvSpPr>
-        <p:spPr>
-          <a:xfrm>
-            <a:off x="3207834" y="3638578"/>
-            <a:ext cx="1167161" cy="914400"/>
-          </a:xfrm>
-          <a:prstGeom prst="rect">
-            <a:avLst/>
-          </a:prstGeom>
-          <a:solidFill>
-            <a:schemeClr val="accent1"/>
-          </a:solidFill>
+          <a:noFill/>
           <a:ln w="28575">
             <a:solidFill>
               <a:schemeClr val="accent1"/>
             </a:solidFill>
+            <a:prstDash val="lgDash"/>
           </a:ln>
         </p:spPr>
         <p:style>
@@ -4345,17 +4652,9 @@
           <a:lstStyle/>
           <a:p>
             <a:pPr algn="ctr"/>
-            <a:r>
-              <a:rPr lang="en-US" dirty="0" smtClean="0">
-                <a:solidFill>
-                  <a:schemeClr val="bg1"/>
-                </a:solidFill>
-              </a:rPr>
-              <a:t>Setpoint</a:t>
-            </a:r>
             <a:endParaRPr lang="en-US" dirty="0">
               <a:solidFill>
-                <a:schemeClr val="bg1"/>
+                <a:schemeClr val="tx1"/>
               </a:solidFill>
             </a:endParaRPr>
           </a:p>
@@ -4363,246 +4662,124 @@
       </p:sp>
       <p:sp>
         <p:nvSpPr>
-          <p:cNvPr id="17" name="Rectangle 16"/>
+          <p:cNvPr id="20" name="Rectangle 19"/>
           <p:cNvSpPr/>
           <p:nvPr/>
         </p:nvSpPr>
         <p:spPr>
           <a:xfrm>
-            <a:off x="4536687" y="3638578"/>
-            <a:ext cx="1167161" cy="914400"/>
+            <a:off x="6017942" y="2509341"/>
+            <a:ext cx="970137" cy="369332"/>
           </a:xfrm>
           <a:prstGeom prst="rect">
             <a:avLst/>
           </a:prstGeom>
-          <a:solidFill>
-            <a:schemeClr val="accent1"/>
-          </a:solidFill>
-          <a:ln w="28575">
-            <a:solidFill>
-              <a:schemeClr val="accent1"/>
-            </a:solidFill>
-          </a:ln>
-        </p:spPr>
-        <p:style>
-          <a:lnRef idx="2">
-            <a:schemeClr val="accent1">
-              <a:shade val="50000"/>
-            </a:schemeClr>
-          </a:lnRef>
-          <a:fillRef idx="1">
-            <a:schemeClr val="accent1"/>
-          </a:fillRef>
-          <a:effectRef idx="0">
-            <a:schemeClr val="accent1"/>
-          </a:effectRef>
-          <a:fontRef idx="minor">
-            <a:schemeClr val="lt1"/>
-          </a:fontRef>
-        </p:style>
-        <p:txBody>
-          <a:bodyPr rtlCol="0" anchor="ctr"/>
-          <a:lstStyle/>
-          <a:p>
-            <a:pPr algn="ctr"/>
-            <a:r>
-              <a:rPr lang="en-US" dirty="0" smtClean="0">
-                <a:solidFill>
-                  <a:schemeClr val="bg1"/>
-                </a:solidFill>
-              </a:rPr>
-              <a:t>Settings</a:t>
-            </a:r>
-            <a:endParaRPr lang="en-US" dirty="0">
-              <a:solidFill>
-                <a:schemeClr val="bg1"/>
-              </a:solidFill>
-            </a:endParaRPr>
-          </a:p>
-        </p:txBody>
-      </p:sp>
-      <p:sp>
-        <p:nvSpPr>
-          <p:cNvPr id="33" name="Rectangle 32"/>
-          <p:cNvSpPr/>
-          <p:nvPr/>
-        </p:nvSpPr>
-        <p:spPr>
-          <a:xfrm>
-            <a:off x="3080439" y="5175334"/>
-            <a:ext cx="2737794" cy="646331"/>
-          </a:xfrm>
-          <a:prstGeom prst="rect">
-            <a:avLst/>
-          </a:prstGeom>
-        </p:spPr>
-        <p:txBody>
-          <a:bodyPr wrap="square">
+        </p:spPr>
+        <p:txBody>
+          <a:bodyPr wrap="none">
             <a:spAutoFit/>
           </a:bodyPr>
           <a:lstStyle/>
           <a:p>
-            <a:pPr algn="ctr"/>
-            <a:r>
-              <a:rPr lang="en-US" dirty="0" smtClean="0"/>
-              <a:t>LWM2M Object Links to internal function blocks</a:t>
+            <a:r>
+              <a:rPr lang="en-US" smtClean="0"/>
+              <a:t>FieldBus</a:t>
             </a:r>
             <a:endParaRPr lang="en-US" dirty="0"/>
           </a:p>
         </p:txBody>
       </p:sp>
-      <p:cxnSp>
-        <p:nvCxnSpPr>
-          <p:cNvPr id="34" name="Straight Arrow Connector 33"/>
-          <p:cNvCxnSpPr/>
-          <p:nvPr/>
-        </p:nvCxnSpPr>
-        <p:spPr>
-          <a:xfrm flipH="1" flipV="1">
-            <a:off x="3966349" y="4326674"/>
-            <a:ext cx="247998" cy="841022"/>
-          </a:xfrm>
-          <a:prstGeom prst="straightConnector1">
-            <a:avLst/>
-          </a:prstGeom>
-          <a:ln w="19050">
-            <a:solidFill>
-              <a:schemeClr val="tx1"/>
-            </a:solidFill>
-            <a:prstDash val="lgDash"/>
-            <a:tailEnd type="triangle"/>
-          </a:ln>
-        </p:spPr>
-        <p:style>
-          <a:lnRef idx="1">
-            <a:schemeClr val="accent1"/>
-          </a:lnRef>
-          <a:fillRef idx="0">
-            <a:schemeClr val="accent1"/>
-          </a:fillRef>
-          <a:effectRef idx="0">
-            <a:schemeClr val="accent1"/>
-          </a:effectRef>
-          <a:fontRef idx="minor">
-            <a:schemeClr val="tx1"/>
-          </a:fontRef>
-        </p:style>
-      </p:cxnSp>
-      <p:cxnSp>
-        <p:nvCxnSpPr>
-          <p:cNvPr id="35" name="Straight Arrow Connector 34"/>
-          <p:cNvCxnSpPr/>
-          <p:nvPr/>
-        </p:nvCxnSpPr>
-        <p:spPr>
-          <a:xfrm flipH="1" flipV="1">
-            <a:off x="3986791" y="3308400"/>
-            <a:ext cx="367759" cy="1866934"/>
-          </a:xfrm>
-          <a:prstGeom prst="straightConnector1">
-            <a:avLst/>
-          </a:prstGeom>
-          <a:ln w="19050">
-            <a:solidFill>
-              <a:schemeClr val="tx1"/>
-            </a:solidFill>
-            <a:prstDash val="lgDash"/>
-            <a:tailEnd type="triangle"/>
-          </a:ln>
-        </p:spPr>
-        <p:style>
-          <a:lnRef idx="1">
-            <a:schemeClr val="accent1"/>
-          </a:lnRef>
-          <a:fillRef idx="0">
-            <a:schemeClr val="accent1"/>
-          </a:fillRef>
-          <a:effectRef idx="0">
-            <a:schemeClr val="accent1"/>
-          </a:effectRef>
-          <a:fontRef idx="minor">
-            <a:schemeClr val="tx1"/>
-          </a:fontRef>
-        </p:style>
-      </p:cxnSp>
-      <p:cxnSp>
-        <p:nvCxnSpPr>
-          <p:cNvPr id="36" name="Straight Arrow Connector 35"/>
-          <p:cNvCxnSpPr/>
-          <p:nvPr/>
-        </p:nvCxnSpPr>
-        <p:spPr>
-          <a:xfrm flipV="1">
-            <a:off x="4560700" y="3169952"/>
-            <a:ext cx="385241" cy="2005382"/>
-          </a:xfrm>
-          <a:prstGeom prst="straightConnector1">
-            <a:avLst/>
-          </a:prstGeom>
-          <a:ln w="19050">
-            <a:solidFill>
-              <a:schemeClr val="tx1"/>
-            </a:solidFill>
-            <a:prstDash val="lgDash"/>
-            <a:tailEnd type="triangle"/>
-          </a:ln>
-        </p:spPr>
-        <p:style>
-          <a:lnRef idx="1">
-            <a:schemeClr val="accent1"/>
-          </a:lnRef>
-          <a:fillRef idx="0">
-            <a:schemeClr val="accent1"/>
-          </a:fillRef>
-          <a:effectRef idx="0">
-            <a:schemeClr val="accent1"/>
-          </a:effectRef>
-          <a:fontRef idx="minor">
-            <a:schemeClr val="tx1"/>
-          </a:fontRef>
-        </p:style>
-      </p:cxnSp>
-      <p:cxnSp>
-        <p:nvCxnSpPr>
-          <p:cNvPr id="38" name="Straight Arrow Connector 37"/>
-          <p:cNvCxnSpPr/>
-          <p:nvPr/>
-        </p:nvCxnSpPr>
-        <p:spPr>
-          <a:xfrm flipV="1">
-            <a:off x="4714815" y="4263292"/>
-            <a:ext cx="352832" cy="904404"/>
-          </a:xfrm>
-          <a:prstGeom prst="straightConnector1">
-            <a:avLst/>
-          </a:prstGeom>
-          <a:ln w="19050">
-            <a:solidFill>
-              <a:schemeClr val="tx1"/>
-            </a:solidFill>
-            <a:prstDash val="lgDash"/>
-            <a:tailEnd type="triangle"/>
-          </a:ln>
-        </p:spPr>
-        <p:style>
-          <a:lnRef idx="1">
-            <a:schemeClr val="accent1"/>
-          </a:lnRef>
-          <a:fillRef idx="0">
-            <a:schemeClr val="accent1"/>
-          </a:fillRef>
-          <a:effectRef idx="0">
-            <a:schemeClr val="accent1"/>
-          </a:effectRef>
-          <a:fontRef idx="minor">
-            <a:schemeClr val="tx1"/>
-          </a:fontRef>
-        </p:style>
-      </p:cxnSp>
+      <p:sp>
+        <p:nvSpPr>
+          <p:cNvPr id="22" name="Rectangle 21"/>
+          <p:cNvSpPr/>
+          <p:nvPr/>
+        </p:nvSpPr>
+        <p:spPr>
+          <a:xfrm>
+            <a:off x="2681751" y="1617625"/>
+            <a:ext cx="2096664" cy="369332"/>
+          </a:xfrm>
+          <a:prstGeom prst="rect">
+            <a:avLst/>
+          </a:prstGeom>
+        </p:spPr>
+        <p:txBody>
+          <a:bodyPr wrap="none">
+            <a:spAutoFit/>
+          </a:bodyPr>
+          <a:lstStyle/>
+          <a:p>
+            <a:r>
+              <a:rPr lang="en-US" smtClean="0"/>
+              <a:t>Fieldbus Transmitter</a:t>
+            </a:r>
+            <a:endParaRPr lang="en-US" dirty="0"/>
+          </a:p>
+        </p:txBody>
+      </p:sp>
+      <p:sp>
+        <p:nvSpPr>
+          <p:cNvPr id="23" name="Rectangle 22"/>
+          <p:cNvSpPr/>
+          <p:nvPr/>
+        </p:nvSpPr>
+        <p:spPr>
+          <a:xfrm>
+            <a:off x="2096449" y="4404376"/>
+            <a:ext cx="970137" cy="369332"/>
+          </a:xfrm>
+          <a:prstGeom prst="rect">
+            <a:avLst/>
+          </a:prstGeom>
+        </p:spPr>
+        <p:txBody>
+          <a:bodyPr wrap="none">
+            <a:spAutoFit/>
+          </a:bodyPr>
+          <a:lstStyle/>
+          <a:p>
+            <a:r>
+              <a:rPr lang="en-US" smtClean="0"/>
+              <a:t>FieldBus</a:t>
+            </a:r>
+            <a:endParaRPr lang="en-US" dirty="0"/>
+          </a:p>
+        </p:txBody>
+      </p:sp>
+      <p:sp>
+        <p:nvSpPr>
+          <p:cNvPr id="24" name="Rectangle 23"/>
+          <p:cNvSpPr/>
+          <p:nvPr/>
+        </p:nvSpPr>
+        <p:spPr>
+          <a:xfrm>
+            <a:off x="4550412" y="3563041"/>
+            <a:ext cx="1820178" cy="369332"/>
+          </a:xfrm>
+          <a:prstGeom prst="rect">
+            <a:avLst/>
+          </a:prstGeom>
+        </p:spPr>
+        <p:txBody>
+          <a:bodyPr wrap="none">
+            <a:spAutoFit/>
+          </a:bodyPr>
+          <a:lstStyle/>
+          <a:p>
+            <a:r>
+              <a:rPr lang="en-US" smtClean="0"/>
+              <a:t>Fieldbus Receiver</a:t>
+            </a:r>
+            <a:endParaRPr lang="en-US" dirty="0"/>
+          </a:p>
+        </p:txBody>
+      </p:sp>
     </p:spTree>
     <p:extLst>
       <p:ext uri="{BB962C8B-B14F-4D97-AF65-F5344CB8AC3E}">
-        <p14:creationId xmlns:p14="http://schemas.microsoft.com/office/powerpoint/2010/main" val="1484407115"/>
+        <p14:creationId xmlns:p14="http://schemas.microsoft.com/office/powerpoint/2010/main" val="1443892791"/>
       </p:ext>
     </p:extLst>
   </p:cSld>
@@ -4641,8 +4818,8 @@
         </p:nvSpPr>
         <p:spPr>
           <a:xfrm>
-            <a:off x="628649" y="365126"/>
-            <a:ext cx="6474677" cy="1325563"/>
+            <a:off x="628650" y="365126"/>
+            <a:ext cx="7032238" cy="1325563"/>
           </a:xfrm>
         </p:spPr>
         <p:txBody>
@@ -4650,16 +4827,12 @@
           <a:lstStyle/>
           <a:p>
             <a:r>
-              <a:rPr lang="en-US" dirty="0" smtClean="0"/>
-              <a:t>Integration Patterns </a:t>
-            </a:r>
-            <a:r>
-              <a:rPr lang="mr-IN" dirty="0" smtClean="0"/>
-              <a:t>–</a:t>
-            </a:r>
-            <a:r>
-              <a:rPr lang="en-US" dirty="0" smtClean="0"/>
-              <a:t> Local Controller Integration  </a:t>
+              <a:rPr lang="en-US" smtClean="0"/>
+              <a:t>Integration Patterns - Modular </a:t>
+            </a:r>
+            <a:r>
+              <a:rPr lang="en-US" dirty="0" smtClean="0"/>
+              <a:t>Controller Example </a:t>
             </a:r>
             <a:endParaRPr lang="en-US" dirty="0"/>
           </a:p>
@@ -4858,7 +5031,7 @@
           <a:lstStyle/>
           <a:p>
             <a:r>
-              <a:rPr lang="en-US" dirty="0" smtClean="0"/>
+              <a:rPr lang="en-US" smtClean="0"/>
               <a:t>Controller</a:t>
             </a:r>
             <a:endParaRPr lang="en-US" dirty="0"/>
@@ -4987,206 +5160,54 @@
       </p:sp>
       <p:sp>
         <p:nvSpPr>
-          <p:cNvPr id="21" name="Rectangle 20"/>
+          <p:cNvPr id="33" name="Rectangle 32"/>
           <p:cNvSpPr/>
           <p:nvPr/>
         </p:nvSpPr>
         <p:spPr>
           <a:xfrm>
-            <a:off x="6523462" y="2563038"/>
-            <a:ext cx="1167161" cy="914400"/>
+            <a:off x="3080439" y="5175334"/>
+            <a:ext cx="2737794" cy="646331"/>
           </a:xfrm>
           <a:prstGeom prst="rect">
             <a:avLst/>
           </a:prstGeom>
-          <a:solidFill>
-            <a:schemeClr val="accent1"/>
-          </a:solidFill>
-          <a:ln w="28575">
-            <a:solidFill>
-              <a:schemeClr val="accent1"/>
-            </a:solidFill>
-          </a:ln>
-        </p:spPr>
-        <p:style>
-          <a:lnRef idx="2">
-            <a:schemeClr val="accent1">
-              <a:shade val="50000"/>
-            </a:schemeClr>
-          </a:lnRef>
-          <a:fillRef idx="1">
-            <a:schemeClr val="accent1"/>
-          </a:fillRef>
-          <a:effectRef idx="0">
-            <a:schemeClr val="accent1"/>
-          </a:effectRef>
-          <a:fontRef idx="minor">
-            <a:schemeClr val="lt1"/>
-          </a:fontRef>
-        </p:style>
-        <p:txBody>
-          <a:bodyPr rtlCol="0" anchor="ctr"/>
+        </p:spPr>
+        <p:txBody>
+          <a:bodyPr wrap="square">
+            <a:spAutoFit/>
+          </a:bodyPr>
           <a:lstStyle/>
           <a:p>
             <a:pPr algn="ctr"/>
             <a:r>
-              <a:rPr lang="en-US" dirty="0" smtClean="0">
-                <a:solidFill>
-                  <a:schemeClr val="bg1"/>
-                </a:solidFill>
-              </a:rPr>
-              <a:t>Actuator</a:t>
-            </a:r>
-            <a:endParaRPr lang="en-US" dirty="0">
-              <a:solidFill>
-                <a:schemeClr val="bg1"/>
-              </a:solidFill>
-            </a:endParaRPr>
-          </a:p>
-        </p:txBody>
-      </p:sp>
-      <p:sp>
-        <p:nvSpPr>
-          <p:cNvPr id="25" name="Rectangle 24"/>
-          <p:cNvSpPr/>
-          <p:nvPr/>
-        </p:nvSpPr>
-        <p:spPr>
-          <a:xfrm>
-            <a:off x="1193183" y="2549041"/>
-            <a:ext cx="1182028" cy="914400"/>
-          </a:xfrm>
-          <a:prstGeom prst="rect">
-            <a:avLst/>
-          </a:prstGeom>
-          <a:solidFill>
-            <a:schemeClr val="accent1"/>
-          </a:solidFill>
-          <a:ln w="28575">
-            <a:solidFill>
-              <a:schemeClr val="accent1"/>
-            </a:solidFill>
-          </a:ln>
-        </p:spPr>
-        <p:style>
-          <a:lnRef idx="2">
-            <a:schemeClr val="accent1">
-              <a:shade val="50000"/>
-            </a:schemeClr>
-          </a:lnRef>
-          <a:fillRef idx="1">
-            <a:schemeClr val="accent1"/>
-          </a:fillRef>
-          <a:effectRef idx="0">
-            <a:schemeClr val="accent1"/>
-          </a:effectRef>
-          <a:fontRef idx="minor">
-            <a:schemeClr val="lt1"/>
-          </a:fontRef>
-        </p:style>
-        <p:txBody>
-          <a:bodyPr rtlCol="0" anchor="ctr"/>
-          <a:lstStyle/>
-          <a:p>
-            <a:pPr algn="ctr"/>
-            <a:r>
-              <a:rPr lang="en-US" dirty="0" smtClean="0">
-                <a:solidFill>
-                  <a:schemeClr val="bg1"/>
-                </a:solidFill>
-              </a:rPr>
-              <a:t>Sensor</a:t>
-            </a:r>
-            <a:endParaRPr lang="en-US" dirty="0">
-              <a:solidFill>
-                <a:schemeClr val="bg1"/>
-              </a:solidFill>
-            </a:endParaRPr>
-          </a:p>
-        </p:txBody>
-      </p:sp>
-      <p:sp>
-        <p:nvSpPr>
-          <p:cNvPr id="26" name="Rectangle 25"/>
-          <p:cNvSpPr/>
-          <p:nvPr/>
-        </p:nvSpPr>
-        <p:spPr>
-          <a:xfrm>
-            <a:off x="1193183" y="3638578"/>
-            <a:ext cx="1182028" cy="914400"/>
-          </a:xfrm>
-          <a:prstGeom prst="rect">
-            <a:avLst/>
-          </a:prstGeom>
-          <a:solidFill>
-            <a:schemeClr val="accent1"/>
-          </a:solidFill>
-          <a:ln w="28575">
-            <a:solidFill>
-              <a:schemeClr val="accent1"/>
-            </a:solidFill>
-          </a:ln>
-        </p:spPr>
-        <p:style>
-          <a:lnRef idx="2">
-            <a:schemeClr val="accent1">
-              <a:shade val="50000"/>
-            </a:schemeClr>
-          </a:lnRef>
-          <a:fillRef idx="1">
-            <a:schemeClr val="accent1"/>
-          </a:fillRef>
-          <a:effectRef idx="0">
-            <a:schemeClr val="accent1"/>
-          </a:effectRef>
-          <a:fontRef idx="minor">
-            <a:schemeClr val="lt1"/>
-          </a:fontRef>
-        </p:style>
-        <p:txBody>
-          <a:bodyPr rtlCol="0" anchor="ctr"/>
-          <a:lstStyle/>
-          <a:p>
-            <a:pPr algn="ctr"/>
-            <a:r>
-              <a:rPr lang="en-US" dirty="0" smtClean="0">
-                <a:solidFill>
-                  <a:schemeClr val="bg1"/>
-                </a:solidFill>
-              </a:rPr>
-              <a:t>HMI</a:t>
-            </a:r>
-            <a:endParaRPr lang="en-US" dirty="0">
-              <a:solidFill>
-                <a:schemeClr val="bg1"/>
-              </a:solidFill>
-            </a:endParaRPr>
+              <a:rPr lang="en-US" dirty="0" smtClean="0"/>
+              <a:t>LWM2M Object Links to internal function blocks</a:t>
+            </a:r>
+            <a:endParaRPr lang="en-US" dirty="0"/>
           </a:p>
         </p:txBody>
       </p:sp>
       <p:cxnSp>
         <p:nvCxnSpPr>
-          <p:cNvPr id="27" name="Straight Arrow Connector 26"/>
-          <p:cNvCxnSpPr>
-            <a:endCxn id="4" idx="1"/>
-          </p:cNvCxnSpPr>
+          <p:cNvPr id="34" name="Straight Arrow Connector 33"/>
+          <p:cNvCxnSpPr/>
           <p:nvPr/>
         </p:nvCxnSpPr>
         <p:spPr>
-          <a:xfrm>
-            <a:off x="2375211" y="3006241"/>
-            <a:ext cx="825190" cy="0"/>
+          <a:xfrm flipH="1" flipV="1">
+            <a:off x="3966349" y="4326674"/>
+            <a:ext cx="247998" cy="841022"/>
           </a:xfrm>
           <a:prstGeom prst="straightConnector1">
             <a:avLst/>
           </a:prstGeom>
-          <a:ln w="28575">
+          <a:ln w="19050">
             <a:solidFill>
-              <a:schemeClr val="accent1"/>
+              <a:schemeClr val="tx1"/>
             </a:solidFill>
-            <a:headEnd type="triangle" w="med" len="med"/>
-            <a:tailEnd type="none" w="med" len="med"/>
+            <a:prstDash val="lgDash"/>
+            <a:tailEnd type="triangle"/>
           </a:ln>
         </p:spPr>
         <p:style>
@@ -5206,24 +5227,24 @@
       </p:cxnSp>
       <p:cxnSp>
         <p:nvCxnSpPr>
-          <p:cNvPr id="28" name="Straight Arrow Connector 27"/>
+          <p:cNvPr id="35" name="Straight Arrow Connector 34"/>
           <p:cNvCxnSpPr/>
           <p:nvPr/>
         </p:nvCxnSpPr>
         <p:spPr>
-          <a:xfrm>
-            <a:off x="2375211" y="4106495"/>
-            <a:ext cx="825190" cy="0"/>
+          <a:xfrm flipH="1" flipV="1">
+            <a:off x="3986791" y="3308400"/>
+            <a:ext cx="367759" cy="1866934"/>
           </a:xfrm>
           <a:prstGeom prst="straightConnector1">
             <a:avLst/>
           </a:prstGeom>
-          <a:ln w="28575">
+          <a:ln w="19050">
             <a:solidFill>
-              <a:schemeClr val="accent1"/>
+              <a:schemeClr val="tx1"/>
             </a:solidFill>
-            <a:headEnd type="triangle" w="med" len="med"/>
-            <a:tailEnd type="none" w="med" len="med"/>
+            <a:prstDash val="lgDash"/>
+            <a:tailEnd type="triangle"/>
           </a:ln>
         </p:spPr>
         <p:style>
@@ -5243,80 +5264,14 @@
       </p:cxnSp>
       <p:cxnSp>
         <p:nvCxnSpPr>
-          <p:cNvPr id="29" name="Straight Arrow Connector 28"/>
+          <p:cNvPr id="36" name="Straight Arrow Connector 35"/>
           <p:cNvCxnSpPr/>
           <p:nvPr/>
         </p:nvCxnSpPr>
         <p:spPr>
-          <a:xfrm>
-            <a:off x="5683405" y="3020238"/>
-            <a:ext cx="825190" cy="0"/>
-          </a:xfrm>
-          <a:prstGeom prst="straightConnector1">
-            <a:avLst/>
-          </a:prstGeom>
-          <a:ln w="28575">
-            <a:solidFill>
-              <a:schemeClr val="accent1"/>
-            </a:solidFill>
-            <a:tailEnd type="triangle"/>
-          </a:ln>
-        </p:spPr>
-        <p:style>
-          <a:lnRef idx="1">
-            <a:schemeClr val="accent1"/>
-          </a:lnRef>
-          <a:fillRef idx="0">
-            <a:schemeClr val="accent1"/>
-          </a:fillRef>
-          <a:effectRef idx="0">
-            <a:schemeClr val="accent1"/>
-          </a:effectRef>
-          <a:fontRef idx="minor">
-            <a:schemeClr val="tx1"/>
-          </a:fontRef>
-        </p:style>
-      </p:cxnSp>
-      <p:sp>
-        <p:nvSpPr>
-          <p:cNvPr id="19" name="Rectangle 18"/>
-          <p:cNvSpPr/>
-          <p:nvPr/>
-        </p:nvSpPr>
-        <p:spPr>
-          <a:xfrm>
-            <a:off x="2919760" y="5172835"/>
-            <a:ext cx="3059152" cy="646331"/>
-          </a:xfrm>
-          <a:prstGeom prst="rect">
-            <a:avLst/>
-          </a:prstGeom>
-        </p:spPr>
-        <p:txBody>
-          <a:bodyPr wrap="square">
-            <a:spAutoFit/>
-          </a:bodyPr>
-          <a:lstStyle/>
-          <a:p>
-            <a:pPr algn="ctr"/>
-            <a:r>
-              <a:rPr lang="en-US" dirty="0" smtClean="0"/>
-              <a:t>LWM2M Object Links to locally integrated function blocks</a:t>
-            </a:r>
-            <a:endParaRPr lang="en-US" dirty="0"/>
-          </a:p>
-        </p:txBody>
-      </p:sp>
-      <p:cxnSp>
-        <p:nvCxnSpPr>
-          <p:cNvPr id="20" name="Straight Arrow Connector 19"/>
-          <p:cNvCxnSpPr/>
-          <p:nvPr/>
-        </p:nvCxnSpPr>
-        <p:spPr>
-          <a:xfrm flipH="1" flipV="1">
-            <a:off x="2787806" y="3155577"/>
-            <a:ext cx="1003608" cy="1895055"/>
+          <a:xfrm flipV="1">
+            <a:off x="4560700" y="3169952"/>
+            <a:ext cx="385241" cy="2005382"/>
           </a:xfrm>
           <a:prstGeom prst="straightConnector1">
             <a:avLst/>
@@ -5346,51 +5301,14 @@
       </p:cxnSp>
       <p:cxnSp>
         <p:nvCxnSpPr>
-          <p:cNvPr id="23" name="Straight Arrow Connector 22"/>
+          <p:cNvPr id="38" name="Straight Arrow Connector 37"/>
           <p:cNvCxnSpPr/>
           <p:nvPr/>
         </p:nvCxnSpPr>
         <p:spPr>
-          <a:xfrm flipH="1" flipV="1">
-            <a:off x="2779443" y="4163447"/>
-            <a:ext cx="793595" cy="887186"/>
-          </a:xfrm>
-          <a:prstGeom prst="straightConnector1">
-            <a:avLst/>
-          </a:prstGeom>
-          <a:ln w="19050">
-            <a:solidFill>
-              <a:schemeClr val="tx1"/>
-            </a:solidFill>
-            <a:prstDash val="lgDash"/>
-            <a:tailEnd type="triangle"/>
-          </a:ln>
-        </p:spPr>
-        <p:style>
-          <a:lnRef idx="1">
-            <a:schemeClr val="accent1"/>
-          </a:lnRef>
-          <a:fillRef idx="0">
-            <a:schemeClr val="accent1"/>
-          </a:fillRef>
-          <a:effectRef idx="0">
-            <a:schemeClr val="accent1"/>
-          </a:effectRef>
-          <a:fontRef idx="minor">
-            <a:schemeClr val="tx1"/>
-          </a:fontRef>
-        </p:style>
-      </p:cxnSp>
-      <p:cxnSp>
-        <p:nvCxnSpPr>
-          <p:cNvPr id="24" name="Straight Arrow Connector 23"/>
-          <p:cNvCxnSpPr/>
-          <p:nvPr/>
-        </p:nvCxnSpPr>
-        <p:spPr>
           <a:xfrm flipV="1">
-            <a:off x="5114689" y="3095234"/>
-            <a:ext cx="1028702" cy="2015740"/>
+            <a:off x="4714815" y="4263292"/>
+            <a:ext cx="352832" cy="904404"/>
           </a:xfrm>
           <a:prstGeom prst="straightConnector1">
             <a:avLst/>
@@ -5421,7 +5339,7 @@
     </p:spTree>
     <p:extLst>
       <p:ext uri="{BB962C8B-B14F-4D97-AF65-F5344CB8AC3E}">
-        <p14:creationId xmlns:p14="http://schemas.microsoft.com/office/powerpoint/2010/main" val="81625678"/>
+        <p14:creationId xmlns:p14="http://schemas.microsoft.com/office/powerpoint/2010/main" val="1484407115"/>
       </p:ext>
     </p:extLst>
   </p:cSld>
@@ -5460,6 +5378,825 @@
         </p:nvSpPr>
         <p:spPr>
           <a:xfrm>
+            <a:off x="628649" y="365126"/>
+            <a:ext cx="6474677" cy="1325563"/>
+          </a:xfrm>
+        </p:spPr>
+        <p:txBody>
+          <a:bodyPr/>
+          <a:lstStyle/>
+          <a:p>
+            <a:r>
+              <a:rPr lang="en-US" dirty="0" smtClean="0"/>
+              <a:t>Integration Patterns </a:t>
+            </a:r>
+            <a:r>
+              <a:rPr lang="mr-IN" dirty="0" smtClean="0"/>
+              <a:t>–</a:t>
+            </a:r>
+            <a:r>
+              <a:rPr lang="en-US" dirty="0" smtClean="0"/>
+              <a:t> Local Controller Integration  </a:t>
+            </a:r>
+            <a:endParaRPr lang="en-US" dirty="0"/>
+          </a:p>
+        </p:txBody>
+      </p:sp>
+      <p:sp>
+        <p:nvSpPr>
+          <p:cNvPr id="4" name="Rectangle 3"/>
+          <p:cNvSpPr/>
+          <p:nvPr/>
+        </p:nvSpPr>
+        <p:spPr>
+          <a:xfrm>
+            <a:off x="3200401" y="2549041"/>
+            <a:ext cx="1182028" cy="914400"/>
+          </a:xfrm>
+          <a:prstGeom prst="rect">
+            <a:avLst/>
+          </a:prstGeom>
+          <a:solidFill>
+            <a:schemeClr val="accent1"/>
+          </a:solidFill>
+          <a:ln w="28575">
+            <a:solidFill>
+              <a:schemeClr val="accent1"/>
+            </a:solidFill>
+          </a:ln>
+        </p:spPr>
+        <p:style>
+          <a:lnRef idx="2">
+            <a:schemeClr val="accent1">
+              <a:shade val="50000"/>
+            </a:schemeClr>
+          </a:lnRef>
+          <a:fillRef idx="1">
+            <a:schemeClr val="accent1"/>
+          </a:fillRef>
+          <a:effectRef idx="0">
+            <a:schemeClr val="accent1"/>
+          </a:effectRef>
+          <a:fontRef idx="minor">
+            <a:schemeClr val="lt1"/>
+          </a:fontRef>
+        </p:style>
+        <p:txBody>
+          <a:bodyPr rtlCol="0" anchor="ctr"/>
+          <a:lstStyle/>
+          <a:p>
+            <a:pPr algn="ctr"/>
+            <a:r>
+              <a:rPr lang="en-US" dirty="0" smtClean="0">
+                <a:solidFill>
+                  <a:schemeClr val="bg1"/>
+                </a:solidFill>
+              </a:rPr>
+              <a:t>Input</a:t>
+            </a:r>
+            <a:endParaRPr lang="en-US" dirty="0">
+              <a:solidFill>
+                <a:schemeClr val="bg1"/>
+              </a:solidFill>
+            </a:endParaRPr>
+          </a:p>
+        </p:txBody>
+      </p:sp>
+      <p:sp>
+        <p:nvSpPr>
+          <p:cNvPr id="5" name="Rectangle 4"/>
+          <p:cNvSpPr/>
+          <p:nvPr/>
+        </p:nvSpPr>
+        <p:spPr>
+          <a:xfrm>
+            <a:off x="4516244" y="2549041"/>
+            <a:ext cx="1167161" cy="914400"/>
+          </a:xfrm>
+          <a:prstGeom prst="rect">
+            <a:avLst/>
+          </a:prstGeom>
+          <a:solidFill>
+            <a:schemeClr val="accent1"/>
+          </a:solidFill>
+          <a:ln w="28575">
+            <a:solidFill>
+              <a:schemeClr val="accent1"/>
+            </a:solidFill>
+          </a:ln>
+        </p:spPr>
+        <p:style>
+          <a:lnRef idx="2">
+            <a:schemeClr val="accent1">
+              <a:shade val="50000"/>
+            </a:schemeClr>
+          </a:lnRef>
+          <a:fillRef idx="1">
+            <a:schemeClr val="accent1"/>
+          </a:fillRef>
+          <a:effectRef idx="0">
+            <a:schemeClr val="accent1"/>
+          </a:effectRef>
+          <a:fontRef idx="minor">
+            <a:schemeClr val="lt1"/>
+          </a:fontRef>
+        </p:style>
+        <p:txBody>
+          <a:bodyPr rtlCol="0" anchor="ctr"/>
+          <a:lstStyle/>
+          <a:p>
+            <a:pPr algn="ctr"/>
+            <a:r>
+              <a:rPr lang="en-US" dirty="0" smtClean="0">
+                <a:solidFill>
+                  <a:schemeClr val="bg1"/>
+                </a:solidFill>
+              </a:rPr>
+              <a:t>Output</a:t>
+            </a:r>
+            <a:endParaRPr lang="en-US" dirty="0">
+              <a:solidFill>
+                <a:schemeClr val="bg1"/>
+              </a:solidFill>
+            </a:endParaRPr>
+          </a:p>
+        </p:txBody>
+      </p:sp>
+      <p:sp>
+        <p:nvSpPr>
+          <p:cNvPr id="18" name="Rectangle 17"/>
+          <p:cNvSpPr/>
+          <p:nvPr/>
+        </p:nvSpPr>
+        <p:spPr>
+          <a:xfrm>
+            <a:off x="3033132" y="2387058"/>
+            <a:ext cx="2832409" cy="2341060"/>
+          </a:xfrm>
+          <a:prstGeom prst="rect">
+            <a:avLst/>
+          </a:prstGeom>
+          <a:noFill/>
+          <a:ln w="28575">
+            <a:solidFill>
+              <a:schemeClr val="accent1"/>
+            </a:solidFill>
+            <a:prstDash val="lgDash"/>
+          </a:ln>
+        </p:spPr>
+        <p:style>
+          <a:lnRef idx="2">
+            <a:schemeClr val="accent1">
+              <a:shade val="50000"/>
+            </a:schemeClr>
+          </a:lnRef>
+          <a:fillRef idx="1">
+            <a:schemeClr val="accent1"/>
+          </a:fillRef>
+          <a:effectRef idx="0">
+            <a:schemeClr val="accent1"/>
+          </a:effectRef>
+          <a:fontRef idx="minor">
+            <a:schemeClr val="lt1"/>
+          </a:fontRef>
+        </p:style>
+        <p:txBody>
+          <a:bodyPr rtlCol="0" anchor="ctr"/>
+          <a:lstStyle/>
+          <a:p>
+            <a:pPr algn="ctr"/>
+            <a:endParaRPr lang="en-US" dirty="0">
+              <a:solidFill>
+                <a:schemeClr val="tx1"/>
+              </a:solidFill>
+            </a:endParaRPr>
+          </a:p>
+        </p:txBody>
+      </p:sp>
+      <p:sp>
+        <p:nvSpPr>
+          <p:cNvPr id="22" name="Rectangle 21"/>
+          <p:cNvSpPr/>
+          <p:nvPr/>
+        </p:nvSpPr>
+        <p:spPr>
+          <a:xfrm>
+            <a:off x="3791415" y="1943182"/>
+            <a:ext cx="1126270" cy="369332"/>
+          </a:xfrm>
+          <a:prstGeom prst="rect">
+            <a:avLst/>
+          </a:prstGeom>
+        </p:spPr>
+        <p:txBody>
+          <a:bodyPr wrap="none">
+            <a:spAutoFit/>
+          </a:bodyPr>
+          <a:lstStyle/>
+          <a:p>
+            <a:r>
+              <a:rPr lang="en-US" dirty="0" smtClean="0"/>
+              <a:t>Controller</a:t>
+            </a:r>
+            <a:endParaRPr lang="en-US" dirty="0"/>
+          </a:p>
+        </p:txBody>
+      </p:sp>
+      <p:sp>
+        <p:nvSpPr>
+          <p:cNvPr id="16" name="Rectangle 15"/>
+          <p:cNvSpPr/>
+          <p:nvPr/>
+        </p:nvSpPr>
+        <p:spPr>
+          <a:xfrm>
+            <a:off x="3207834" y="3638578"/>
+            <a:ext cx="1167161" cy="914400"/>
+          </a:xfrm>
+          <a:prstGeom prst="rect">
+            <a:avLst/>
+          </a:prstGeom>
+          <a:solidFill>
+            <a:schemeClr val="accent1"/>
+          </a:solidFill>
+          <a:ln w="28575">
+            <a:solidFill>
+              <a:schemeClr val="accent1"/>
+            </a:solidFill>
+          </a:ln>
+        </p:spPr>
+        <p:style>
+          <a:lnRef idx="2">
+            <a:schemeClr val="accent1">
+              <a:shade val="50000"/>
+            </a:schemeClr>
+          </a:lnRef>
+          <a:fillRef idx="1">
+            <a:schemeClr val="accent1"/>
+          </a:fillRef>
+          <a:effectRef idx="0">
+            <a:schemeClr val="accent1"/>
+          </a:effectRef>
+          <a:fontRef idx="minor">
+            <a:schemeClr val="lt1"/>
+          </a:fontRef>
+        </p:style>
+        <p:txBody>
+          <a:bodyPr rtlCol="0" anchor="ctr"/>
+          <a:lstStyle/>
+          <a:p>
+            <a:pPr algn="ctr"/>
+            <a:r>
+              <a:rPr lang="en-US" dirty="0" smtClean="0">
+                <a:solidFill>
+                  <a:schemeClr val="bg1"/>
+                </a:solidFill>
+              </a:rPr>
+              <a:t>Setpoint</a:t>
+            </a:r>
+            <a:endParaRPr lang="en-US" dirty="0">
+              <a:solidFill>
+                <a:schemeClr val="bg1"/>
+              </a:solidFill>
+            </a:endParaRPr>
+          </a:p>
+        </p:txBody>
+      </p:sp>
+      <p:sp>
+        <p:nvSpPr>
+          <p:cNvPr id="17" name="Rectangle 16"/>
+          <p:cNvSpPr/>
+          <p:nvPr/>
+        </p:nvSpPr>
+        <p:spPr>
+          <a:xfrm>
+            <a:off x="4536687" y="3638578"/>
+            <a:ext cx="1167161" cy="914400"/>
+          </a:xfrm>
+          <a:prstGeom prst="rect">
+            <a:avLst/>
+          </a:prstGeom>
+          <a:solidFill>
+            <a:schemeClr val="accent1"/>
+          </a:solidFill>
+          <a:ln w="28575">
+            <a:solidFill>
+              <a:schemeClr val="accent1"/>
+            </a:solidFill>
+          </a:ln>
+        </p:spPr>
+        <p:style>
+          <a:lnRef idx="2">
+            <a:schemeClr val="accent1">
+              <a:shade val="50000"/>
+            </a:schemeClr>
+          </a:lnRef>
+          <a:fillRef idx="1">
+            <a:schemeClr val="accent1"/>
+          </a:fillRef>
+          <a:effectRef idx="0">
+            <a:schemeClr val="accent1"/>
+          </a:effectRef>
+          <a:fontRef idx="minor">
+            <a:schemeClr val="lt1"/>
+          </a:fontRef>
+        </p:style>
+        <p:txBody>
+          <a:bodyPr rtlCol="0" anchor="ctr"/>
+          <a:lstStyle/>
+          <a:p>
+            <a:pPr algn="ctr"/>
+            <a:r>
+              <a:rPr lang="en-US" dirty="0" smtClean="0">
+                <a:solidFill>
+                  <a:schemeClr val="bg1"/>
+                </a:solidFill>
+              </a:rPr>
+              <a:t>Settings</a:t>
+            </a:r>
+            <a:endParaRPr lang="en-US" dirty="0">
+              <a:solidFill>
+                <a:schemeClr val="bg1"/>
+              </a:solidFill>
+            </a:endParaRPr>
+          </a:p>
+        </p:txBody>
+      </p:sp>
+      <p:sp>
+        <p:nvSpPr>
+          <p:cNvPr id="21" name="Rectangle 20"/>
+          <p:cNvSpPr/>
+          <p:nvPr/>
+        </p:nvSpPr>
+        <p:spPr>
+          <a:xfrm>
+            <a:off x="6523462" y="2563038"/>
+            <a:ext cx="1167161" cy="914400"/>
+          </a:xfrm>
+          <a:prstGeom prst="rect">
+            <a:avLst/>
+          </a:prstGeom>
+          <a:solidFill>
+            <a:schemeClr val="accent1"/>
+          </a:solidFill>
+          <a:ln w="28575">
+            <a:solidFill>
+              <a:schemeClr val="accent1"/>
+            </a:solidFill>
+          </a:ln>
+        </p:spPr>
+        <p:style>
+          <a:lnRef idx="2">
+            <a:schemeClr val="accent1">
+              <a:shade val="50000"/>
+            </a:schemeClr>
+          </a:lnRef>
+          <a:fillRef idx="1">
+            <a:schemeClr val="accent1"/>
+          </a:fillRef>
+          <a:effectRef idx="0">
+            <a:schemeClr val="accent1"/>
+          </a:effectRef>
+          <a:fontRef idx="minor">
+            <a:schemeClr val="lt1"/>
+          </a:fontRef>
+        </p:style>
+        <p:txBody>
+          <a:bodyPr rtlCol="0" anchor="ctr"/>
+          <a:lstStyle/>
+          <a:p>
+            <a:pPr algn="ctr"/>
+            <a:r>
+              <a:rPr lang="en-US" dirty="0" smtClean="0">
+                <a:solidFill>
+                  <a:schemeClr val="bg1"/>
+                </a:solidFill>
+              </a:rPr>
+              <a:t>Actuator</a:t>
+            </a:r>
+            <a:endParaRPr lang="en-US" dirty="0">
+              <a:solidFill>
+                <a:schemeClr val="bg1"/>
+              </a:solidFill>
+            </a:endParaRPr>
+          </a:p>
+        </p:txBody>
+      </p:sp>
+      <p:sp>
+        <p:nvSpPr>
+          <p:cNvPr id="25" name="Rectangle 24"/>
+          <p:cNvSpPr/>
+          <p:nvPr/>
+        </p:nvSpPr>
+        <p:spPr>
+          <a:xfrm>
+            <a:off x="1193183" y="2549041"/>
+            <a:ext cx="1182028" cy="914400"/>
+          </a:xfrm>
+          <a:prstGeom prst="rect">
+            <a:avLst/>
+          </a:prstGeom>
+          <a:solidFill>
+            <a:schemeClr val="accent1"/>
+          </a:solidFill>
+          <a:ln w="28575">
+            <a:solidFill>
+              <a:schemeClr val="accent1"/>
+            </a:solidFill>
+          </a:ln>
+        </p:spPr>
+        <p:style>
+          <a:lnRef idx="2">
+            <a:schemeClr val="accent1">
+              <a:shade val="50000"/>
+            </a:schemeClr>
+          </a:lnRef>
+          <a:fillRef idx="1">
+            <a:schemeClr val="accent1"/>
+          </a:fillRef>
+          <a:effectRef idx="0">
+            <a:schemeClr val="accent1"/>
+          </a:effectRef>
+          <a:fontRef idx="minor">
+            <a:schemeClr val="lt1"/>
+          </a:fontRef>
+        </p:style>
+        <p:txBody>
+          <a:bodyPr rtlCol="0" anchor="ctr"/>
+          <a:lstStyle/>
+          <a:p>
+            <a:pPr algn="ctr"/>
+            <a:r>
+              <a:rPr lang="en-US" dirty="0" smtClean="0">
+                <a:solidFill>
+                  <a:schemeClr val="bg1"/>
+                </a:solidFill>
+              </a:rPr>
+              <a:t>Sensor</a:t>
+            </a:r>
+            <a:endParaRPr lang="en-US" dirty="0">
+              <a:solidFill>
+                <a:schemeClr val="bg1"/>
+              </a:solidFill>
+            </a:endParaRPr>
+          </a:p>
+        </p:txBody>
+      </p:sp>
+      <p:sp>
+        <p:nvSpPr>
+          <p:cNvPr id="26" name="Rectangle 25"/>
+          <p:cNvSpPr/>
+          <p:nvPr/>
+        </p:nvSpPr>
+        <p:spPr>
+          <a:xfrm>
+            <a:off x="1193183" y="3638578"/>
+            <a:ext cx="1182028" cy="914400"/>
+          </a:xfrm>
+          <a:prstGeom prst="rect">
+            <a:avLst/>
+          </a:prstGeom>
+          <a:solidFill>
+            <a:schemeClr val="accent1"/>
+          </a:solidFill>
+          <a:ln w="28575">
+            <a:solidFill>
+              <a:schemeClr val="accent1"/>
+            </a:solidFill>
+          </a:ln>
+        </p:spPr>
+        <p:style>
+          <a:lnRef idx="2">
+            <a:schemeClr val="accent1">
+              <a:shade val="50000"/>
+            </a:schemeClr>
+          </a:lnRef>
+          <a:fillRef idx="1">
+            <a:schemeClr val="accent1"/>
+          </a:fillRef>
+          <a:effectRef idx="0">
+            <a:schemeClr val="accent1"/>
+          </a:effectRef>
+          <a:fontRef idx="minor">
+            <a:schemeClr val="lt1"/>
+          </a:fontRef>
+        </p:style>
+        <p:txBody>
+          <a:bodyPr rtlCol="0" anchor="ctr"/>
+          <a:lstStyle/>
+          <a:p>
+            <a:pPr algn="ctr"/>
+            <a:r>
+              <a:rPr lang="en-US" dirty="0" smtClean="0">
+                <a:solidFill>
+                  <a:schemeClr val="bg1"/>
+                </a:solidFill>
+              </a:rPr>
+              <a:t>HMI</a:t>
+            </a:r>
+            <a:endParaRPr lang="en-US" dirty="0">
+              <a:solidFill>
+                <a:schemeClr val="bg1"/>
+              </a:solidFill>
+            </a:endParaRPr>
+          </a:p>
+        </p:txBody>
+      </p:sp>
+      <p:cxnSp>
+        <p:nvCxnSpPr>
+          <p:cNvPr id="27" name="Straight Arrow Connector 26"/>
+          <p:cNvCxnSpPr>
+            <a:endCxn id="4" idx="1"/>
+          </p:cNvCxnSpPr>
+          <p:nvPr/>
+        </p:nvCxnSpPr>
+        <p:spPr>
+          <a:xfrm>
+            <a:off x="2375211" y="3006241"/>
+            <a:ext cx="825190" cy="0"/>
+          </a:xfrm>
+          <a:prstGeom prst="straightConnector1">
+            <a:avLst/>
+          </a:prstGeom>
+          <a:ln w="28575">
+            <a:solidFill>
+              <a:schemeClr val="accent1"/>
+            </a:solidFill>
+            <a:headEnd type="triangle" w="med" len="med"/>
+            <a:tailEnd type="none" w="med" len="med"/>
+          </a:ln>
+        </p:spPr>
+        <p:style>
+          <a:lnRef idx="1">
+            <a:schemeClr val="accent1"/>
+          </a:lnRef>
+          <a:fillRef idx="0">
+            <a:schemeClr val="accent1"/>
+          </a:fillRef>
+          <a:effectRef idx="0">
+            <a:schemeClr val="accent1"/>
+          </a:effectRef>
+          <a:fontRef idx="minor">
+            <a:schemeClr val="tx1"/>
+          </a:fontRef>
+        </p:style>
+      </p:cxnSp>
+      <p:cxnSp>
+        <p:nvCxnSpPr>
+          <p:cNvPr id="28" name="Straight Arrow Connector 27"/>
+          <p:cNvCxnSpPr/>
+          <p:nvPr/>
+        </p:nvCxnSpPr>
+        <p:spPr>
+          <a:xfrm>
+            <a:off x="2375211" y="4106495"/>
+            <a:ext cx="825190" cy="0"/>
+          </a:xfrm>
+          <a:prstGeom prst="straightConnector1">
+            <a:avLst/>
+          </a:prstGeom>
+          <a:ln w="28575">
+            <a:solidFill>
+              <a:schemeClr val="accent1"/>
+            </a:solidFill>
+            <a:headEnd type="triangle" w="med" len="med"/>
+            <a:tailEnd type="none" w="med" len="med"/>
+          </a:ln>
+        </p:spPr>
+        <p:style>
+          <a:lnRef idx="1">
+            <a:schemeClr val="accent1"/>
+          </a:lnRef>
+          <a:fillRef idx="0">
+            <a:schemeClr val="accent1"/>
+          </a:fillRef>
+          <a:effectRef idx="0">
+            <a:schemeClr val="accent1"/>
+          </a:effectRef>
+          <a:fontRef idx="minor">
+            <a:schemeClr val="tx1"/>
+          </a:fontRef>
+        </p:style>
+      </p:cxnSp>
+      <p:cxnSp>
+        <p:nvCxnSpPr>
+          <p:cNvPr id="29" name="Straight Arrow Connector 28"/>
+          <p:cNvCxnSpPr/>
+          <p:nvPr/>
+        </p:nvCxnSpPr>
+        <p:spPr>
+          <a:xfrm>
+            <a:off x="5683405" y="3020238"/>
+            <a:ext cx="825190" cy="0"/>
+          </a:xfrm>
+          <a:prstGeom prst="straightConnector1">
+            <a:avLst/>
+          </a:prstGeom>
+          <a:ln w="28575">
+            <a:solidFill>
+              <a:schemeClr val="accent1"/>
+            </a:solidFill>
+            <a:tailEnd type="triangle"/>
+          </a:ln>
+        </p:spPr>
+        <p:style>
+          <a:lnRef idx="1">
+            <a:schemeClr val="accent1"/>
+          </a:lnRef>
+          <a:fillRef idx="0">
+            <a:schemeClr val="accent1"/>
+          </a:fillRef>
+          <a:effectRef idx="0">
+            <a:schemeClr val="accent1"/>
+          </a:effectRef>
+          <a:fontRef idx="minor">
+            <a:schemeClr val="tx1"/>
+          </a:fontRef>
+        </p:style>
+      </p:cxnSp>
+      <p:sp>
+        <p:nvSpPr>
+          <p:cNvPr id="19" name="Rectangle 18"/>
+          <p:cNvSpPr/>
+          <p:nvPr/>
+        </p:nvSpPr>
+        <p:spPr>
+          <a:xfrm>
+            <a:off x="2919760" y="5172835"/>
+            <a:ext cx="3059152" cy="646331"/>
+          </a:xfrm>
+          <a:prstGeom prst="rect">
+            <a:avLst/>
+          </a:prstGeom>
+        </p:spPr>
+        <p:txBody>
+          <a:bodyPr wrap="square">
+            <a:spAutoFit/>
+          </a:bodyPr>
+          <a:lstStyle/>
+          <a:p>
+            <a:pPr algn="ctr"/>
+            <a:r>
+              <a:rPr lang="en-US" dirty="0" smtClean="0"/>
+              <a:t>LWM2M Object Links to locally integrated function blocks</a:t>
+            </a:r>
+            <a:endParaRPr lang="en-US" dirty="0"/>
+          </a:p>
+        </p:txBody>
+      </p:sp>
+      <p:cxnSp>
+        <p:nvCxnSpPr>
+          <p:cNvPr id="20" name="Straight Arrow Connector 19"/>
+          <p:cNvCxnSpPr/>
+          <p:nvPr/>
+        </p:nvCxnSpPr>
+        <p:spPr>
+          <a:xfrm flipH="1" flipV="1">
+            <a:off x="2787806" y="3155577"/>
+            <a:ext cx="1003608" cy="1895055"/>
+          </a:xfrm>
+          <a:prstGeom prst="straightConnector1">
+            <a:avLst/>
+          </a:prstGeom>
+          <a:ln w="19050">
+            <a:solidFill>
+              <a:schemeClr val="tx1"/>
+            </a:solidFill>
+            <a:prstDash val="lgDash"/>
+            <a:tailEnd type="triangle"/>
+          </a:ln>
+        </p:spPr>
+        <p:style>
+          <a:lnRef idx="1">
+            <a:schemeClr val="accent1"/>
+          </a:lnRef>
+          <a:fillRef idx="0">
+            <a:schemeClr val="accent1"/>
+          </a:fillRef>
+          <a:effectRef idx="0">
+            <a:schemeClr val="accent1"/>
+          </a:effectRef>
+          <a:fontRef idx="minor">
+            <a:schemeClr val="tx1"/>
+          </a:fontRef>
+        </p:style>
+      </p:cxnSp>
+      <p:cxnSp>
+        <p:nvCxnSpPr>
+          <p:cNvPr id="23" name="Straight Arrow Connector 22"/>
+          <p:cNvCxnSpPr/>
+          <p:nvPr/>
+        </p:nvCxnSpPr>
+        <p:spPr>
+          <a:xfrm flipH="1" flipV="1">
+            <a:off x="2779443" y="4163447"/>
+            <a:ext cx="793595" cy="887186"/>
+          </a:xfrm>
+          <a:prstGeom prst="straightConnector1">
+            <a:avLst/>
+          </a:prstGeom>
+          <a:ln w="19050">
+            <a:solidFill>
+              <a:schemeClr val="tx1"/>
+            </a:solidFill>
+            <a:prstDash val="lgDash"/>
+            <a:tailEnd type="triangle"/>
+          </a:ln>
+        </p:spPr>
+        <p:style>
+          <a:lnRef idx="1">
+            <a:schemeClr val="accent1"/>
+          </a:lnRef>
+          <a:fillRef idx="0">
+            <a:schemeClr val="accent1"/>
+          </a:fillRef>
+          <a:effectRef idx="0">
+            <a:schemeClr val="accent1"/>
+          </a:effectRef>
+          <a:fontRef idx="minor">
+            <a:schemeClr val="tx1"/>
+          </a:fontRef>
+        </p:style>
+      </p:cxnSp>
+      <p:cxnSp>
+        <p:nvCxnSpPr>
+          <p:cNvPr id="24" name="Straight Arrow Connector 23"/>
+          <p:cNvCxnSpPr/>
+          <p:nvPr/>
+        </p:nvCxnSpPr>
+        <p:spPr>
+          <a:xfrm flipV="1">
+            <a:off x="5114689" y="3095234"/>
+            <a:ext cx="1028702" cy="2015740"/>
+          </a:xfrm>
+          <a:prstGeom prst="straightConnector1">
+            <a:avLst/>
+          </a:prstGeom>
+          <a:ln w="19050">
+            <a:solidFill>
+              <a:schemeClr val="tx1"/>
+            </a:solidFill>
+            <a:prstDash val="lgDash"/>
+            <a:tailEnd type="triangle"/>
+          </a:ln>
+        </p:spPr>
+        <p:style>
+          <a:lnRef idx="1">
+            <a:schemeClr val="accent1"/>
+          </a:lnRef>
+          <a:fillRef idx="0">
+            <a:schemeClr val="accent1"/>
+          </a:fillRef>
+          <a:effectRef idx="0">
+            <a:schemeClr val="accent1"/>
+          </a:effectRef>
+          <a:fontRef idx="minor">
+            <a:schemeClr val="tx1"/>
+          </a:fontRef>
+        </p:style>
+      </p:cxnSp>
+    </p:spTree>
+    <p:extLst>
+      <p:ext uri="{BB962C8B-B14F-4D97-AF65-F5344CB8AC3E}">
+        <p14:creationId xmlns:p14="http://schemas.microsoft.com/office/powerpoint/2010/main" val="81625678"/>
+      </p:ext>
+    </p:extLst>
+  </p:cSld>
+  <p:clrMapOvr>
+    <a:masterClrMapping/>
+  </p:clrMapOvr>
+</p:sld>
+</file>
+
+<file path=ppt/slides/slide17.xml><?xml version="1.0" encoding="utf-8"?>
+<p:sld xmlns:a="http://schemas.openxmlformats.org/drawingml/2006/main" xmlns:r="http://schemas.openxmlformats.org/officeDocument/2006/relationships" xmlns:p="http://schemas.openxmlformats.org/presentationml/2006/main">
+  <p:cSld>
+    <p:spTree>
+      <p:nvGrpSpPr>
+        <p:cNvPr id="1" name=""/>
+        <p:cNvGrpSpPr/>
+        <p:nvPr/>
+      </p:nvGrpSpPr>
+      <p:grpSpPr>
+        <a:xfrm>
+          <a:off x="0" y="0"/>
+          <a:ext cx="0" cy="0"/>
+          <a:chOff x="0" y="0"/>
+          <a:chExt cx="0" cy="0"/>
+        </a:xfrm>
+      </p:grpSpPr>
+      <p:sp>
+        <p:nvSpPr>
+          <p:cNvPr id="2" name="Title 1"/>
+          <p:cNvSpPr>
+            <a:spLocks noGrp="1"/>
+          </p:cNvSpPr>
+          <p:nvPr>
+            <p:ph type="title"/>
+          </p:nvPr>
+        </p:nvSpPr>
+        <p:spPr>
+          <a:xfrm>
             <a:off x="628650" y="365126"/>
             <a:ext cx="7299867" cy="1325563"/>
           </a:xfrm>
@@ -6394,7 +7131,7 @@
 </p:sld>
 </file>
 
-<file path=ppt/slides/slide17.xml><?xml version="1.0" encoding="utf-8"?>
+<file path=ppt/slides/slide18.xml><?xml version="1.0" encoding="utf-8"?>
 <p:sld xmlns:a="http://schemas.openxmlformats.org/drawingml/2006/main" xmlns:r="http://schemas.openxmlformats.org/officeDocument/2006/relationships" xmlns:p="http://schemas.openxmlformats.org/presentationml/2006/main">
   <p:cSld>
     <p:spTree>
@@ -9417,11 +10154,7 @@
             <a:pPr algn="ctr"/>
             <a:r>
               <a:rPr lang="en-US" sz="1600" dirty="0" smtClean="0"/>
-              <a:t>OPC-UA </a:t>
-            </a:r>
-            <a:r>
-              <a:rPr lang="en-US" sz="1600" dirty="0" smtClean="0"/>
-              <a:t>Info</a:t>
+              <a:t>OPC UA Info</a:t>
             </a:r>
           </a:p>
           <a:p>
@@ -10024,6 +10757,145 @@
               <a:rPr lang="en-US" smtClean="0"/>
               <a:t>Node-wot, Digital Twin</a:t>
             </a:r>
+            <a:endParaRPr lang="en-US" dirty="0"/>
+          </a:p>
+        </p:txBody>
+      </p:sp>
+      <p:sp>
+        <p:nvSpPr>
+          <p:cNvPr id="23" name="Snip Single Corner Rectangle 22"/>
+          <p:cNvSpPr/>
+          <p:nvPr/>
+        </p:nvSpPr>
+        <p:spPr>
+          <a:xfrm>
+            <a:off x="5550770" y="4786811"/>
+            <a:ext cx="1014761" cy="1189638"/>
+          </a:xfrm>
+          <a:prstGeom prst="snip1Rect">
+            <a:avLst/>
+          </a:prstGeom>
+          <a:gradFill flip="none" rotWithShape="1">
+            <a:gsLst>
+              <a:gs pos="0">
+                <a:schemeClr val="accent1">
+                  <a:tint val="66000"/>
+                  <a:satMod val="160000"/>
+                  <a:lumMod val="85000"/>
+                </a:schemeClr>
+              </a:gs>
+              <a:gs pos="65000">
+                <a:schemeClr val="accent1">
+                  <a:tint val="44500"/>
+                  <a:satMod val="160000"/>
+                  <a:lumMod val="78000"/>
+                </a:schemeClr>
+              </a:gs>
+              <a:gs pos="100000">
+                <a:schemeClr val="accent1">
+                  <a:tint val="23500"/>
+                  <a:satMod val="160000"/>
+                </a:schemeClr>
+              </a:gs>
+            </a:gsLst>
+            <a:lin ang="5400000" scaled="1"/>
+            <a:tileRect/>
+          </a:gradFill>
+        </p:spPr>
+        <p:style>
+          <a:lnRef idx="2">
+            <a:schemeClr val="accent1">
+              <a:shade val="50000"/>
+            </a:schemeClr>
+          </a:lnRef>
+          <a:fillRef idx="1">
+            <a:schemeClr val="accent1"/>
+          </a:fillRef>
+          <a:effectRef idx="0">
+            <a:schemeClr val="accent1"/>
+          </a:effectRef>
+          <a:fontRef idx="minor">
+            <a:schemeClr val="lt1"/>
+          </a:fontRef>
+        </p:style>
+        <p:txBody>
+          <a:bodyPr rtlCol="0" anchor="ctr"/>
+          <a:lstStyle/>
+          <a:p>
+            <a:pPr algn="ctr"/>
+            <a:r>
+              <a:rPr lang="en-US" sz="1600" dirty="0" smtClean="0"/>
+              <a:t>OPC UA </a:t>
+            </a:r>
+            <a:r>
+              <a:rPr lang="en-US" sz="1600" dirty="0" err="1" smtClean="0"/>
+              <a:t>Nodeset</a:t>
+            </a:r>
+            <a:endParaRPr lang="en-US" sz="1600" dirty="0"/>
+          </a:p>
+        </p:txBody>
+      </p:sp>
+      <p:sp>
+        <p:nvSpPr>
+          <p:cNvPr id="25" name="Right Arrow 24"/>
+          <p:cNvSpPr/>
+          <p:nvPr/>
+        </p:nvSpPr>
+        <p:spPr>
+          <a:xfrm>
+            <a:off x="4375796" y="4928738"/>
+            <a:ext cx="1074277" cy="905783"/>
+          </a:xfrm>
+          <a:prstGeom prst="rightArrow">
+            <a:avLst/>
+          </a:prstGeom>
+          <a:gradFill>
+            <a:gsLst>
+              <a:gs pos="0">
+                <a:schemeClr val="accent1">
+                  <a:tint val="66000"/>
+                  <a:satMod val="160000"/>
+                  <a:lumMod val="85000"/>
+                </a:schemeClr>
+              </a:gs>
+              <a:gs pos="45000">
+                <a:schemeClr val="accent1">
+                  <a:tint val="44500"/>
+                  <a:satMod val="160000"/>
+                  <a:lumMod val="78000"/>
+                </a:schemeClr>
+              </a:gs>
+              <a:gs pos="100000">
+                <a:schemeClr val="accent1">
+                  <a:tint val="23500"/>
+                  <a:satMod val="160000"/>
+                </a:schemeClr>
+              </a:gs>
+            </a:gsLst>
+            <a:lin ang="5400000" scaled="1"/>
+          </a:gradFill>
+        </p:spPr>
+        <p:style>
+          <a:lnRef idx="2">
+            <a:schemeClr val="accent1">
+              <a:shade val="50000"/>
+            </a:schemeClr>
+          </a:lnRef>
+          <a:fillRef idx="1">
+            <a:schemeClr val="accent1"/>
+          </a:fillRef>
+          <a:effectRef idx="0">
+            <a:schemeClr val="accent1"/>
+          </a:effectRef>
+          <a:fontRef idx="minor">
+            <a:schemeClr val="lt1"/>
+          </a:fontRef>
+        </p:style>
+        <p:txBody>
+          <a:bodyPr rtlCol="0" anchor="ctr"/>
+          <a:lstStyle/>
+          <a:p>
+            <a:pPr algn="ctr"/>
             <a:endParaRPr lang="en-US" dirty="0"/>
           </a:p>
         </p:txBody>

</xml_diff>